<commit_message>
Finished PDI methodology, started simulation
Finished tgo and PDI, made architecture diagram
</commit_message>
<xml_diff>
--- a/Written/Defense/Defense.pptx
+++ b/Written/Defense/Defense.pptx
@@ -5,7 +5,7 @@
     <p:sldMasterId id="2147483648" r:id="rId1"/>
   </p:sldMasterIdLst>
   <p:notesMasterIdLst>
-    <p:notesMasterId r:id="rId14"/>
+    <p:notesMasterId r:id="rId20"/>
   </p:notesMasterIdLst>
   <p:sldIdLst>
     <p:sldId id="256" r:id="rId2"/>
@@ -18,8 +18,14 @@
     <p:sldId id="267" r:id="rId9"/>
     <p:sldId id="260" r:id="rId10"/>
     <p:sldId id="268" r:id="rId11"/>
-    <p:sldId id="261" r:id="rId12"/>
-    <p:sldId id="262" r:id="rId13"/>
+    <p:sldId id="270" r:id="rId12"/>
+    <p:sldId id="269" r:id="rId13"/>
+    <p:sldId id="271" r:id="rId14"/>
+    <p:sldId id="272" r:id="rId15"/>
+    <p:sldId id="273" r:id="rId16"/>
+    <p:sldId id="274" r:id="rId17"/>
+    <p:sldId id="261" r:id="rId18"/>
+    <p:sldId id="262" r:id="rId19"/>
   </p:sldIdLst>
   <p:sldSz cx="12192000" cy="6858000"/>
   <p:notesSz cx="6858000" cy="9144000"/>
@@ -145,6 +151,16 @@
           <p14:sldIdLst>
             <p14:sldId id="260"/>
             <p14:sldId id="268"/>
+            <p14:sldId id="270"/>
+            <p14:sldId id="269"/>
+            <p14:sldId id="271"/>
+            <p14:sldId id="272"/>
+          </p14:sldIdLst>
+        </p14:section>
+        <p14:section name="Simulation" id="{157073B2-5601-4945-9911-8A6FB3695852}">
+          <p14:sldIdLst>
+            <p14:sldId id="273"/>
+            <p14:sldId id="274"/>
           </p14:sldIdLst>
         </p14:section>
         <p14:section name="Results and Discussion" id="{ADAC7245-5CE2-430F-89A2-EA8E14445414}">
@@ -3876,8 +3892,8 @@
           </a:prstGeom>
         </p:spPr>
       </p:pic>
-      <mc:AlternateContent xmlns:mc="http://schemas.openxmlformats.org/markup-compatibility/2006">
-        <mc:Choice xmlns:a14="http://schemas.microsoft.com/office/drawing/2010/main" Requires="a14">
+      <mc:AlternateContent xmlns:mc="http://schemas.openxmlformats.org/markup-compatibility/2006" xmlns:a14="http://schemas.microsoft.com/office/drawing/2010/main">
+        <mc:Choice Requires="a14">
           <p:sp>
             <p:nvSpPr>
               <p:cNvPr id="7" name="Text Placeholder 6">
@@ -3902,7 +3918,7 @@
             </p:spPr>
             <p:txBody>
               <a:bodyPr>
-                <a:normAutofit fontScale="92500"/>
+                <a:normAutofit fontScale="92500" lnSpcReduction="10000"/>
               </a:bodyPr>
               <a:lstStyle/>
               <a:p>
@@ -3913,6 +3929,16 @@
                 <a:r>
                   <a:rPr lang="en-US" dirty="0"/>
                   <a:t>Cherry derived E-Guidance and APDG, a version of E-Guidance, by framing powered descent as separate boundary value problems in each dimension. Vector boundary conditions in position and velocity for E-Guidance, and final attitude through thrust acceleration for APDG, form the constraints of the problem.</a:t>
+                </a:r>
+              </a:p>
+              <a:p>
+                <a:pPr marL="285750" indent="-285750">
+                  <a:buFont typeface="Arial" panose="020B0604020202020204" pitchFamily="34" charset="0"/>
+                  <a:buChar char="•"/>
+                </a:pPr>
+                <a:r>
+                  <a:rPr lang="en-US" dirty="0"/>
+                  <a:t>Final attitude control helps ensure soft landing under practical mission conditions</a:t>
                 </a:r>
               </a:p>
               <a:p>
@@ -4235,7 +4261,7 @@
             </p:txBody>
           </p:sp>
         </mc:Choice>
-        <mc:Fallback>
+        <mc:Fallback xmlns="">
           <p:sp>
             <p:nvSpPr>
               <p:cNvPr id="7" name="Text Placeholder 6">
@@ -4260,7 +4286,7 @@
               <a:blipFill>
                 <a:blip r:embed="rId3"/>
                 <a:stretch>
-                  <a:fillRect l="-465" t="-843" r="-10078"/>
+                  <a:fillRect l="-465" t="-1264" r="-10078"/>
                 </a:stretch>
               </a:blipFill>
             </p:spPr>
@@ -4373,8 +4399,8 @@
           </a:prstGeom>
         </p:spPr>
       </p:pic>
-      <mc:AlternateContent xmlns:mc="http://schemas.openxmlformats.org/markup-compatibility/2006">
-        <mc:Choice xmlns:a14="http://schemas.microsoft.com/office/drawing/2010/main" Requires="a14">
+      <mc:AlternateContent xmlns:mc="http://schemas.openxmlformats.org/markup-compatibility/2006" xmlns:a14="http://schemas.microsoft.com/office/drawing/2010/main">
+        <mc:Choice Requires="a14">
           <p:sp>
             <p:nvSpPr>
               <p:cNvPr id="13" name="Rectangle 12">
@@ -4489,7 +4515,7 @@
             </p:txBody>
           </p:sp>
         </mc:Choice>
-        <mc:Fallback>
+        <mc:Fallback xmlns="">
           <p:sp>
             <p:nvSpPr>
               <p:cNvPr id="13" name="Rectangle 12">
@@ -4534,8 +4560,8 @@
           </p:sp>
         </mc:Fallback>
       </mc:AlternateContent>
-      <mc:AlternateContent xmlns:mc="http://schemas.openxmlformats.org/markup-compatibility/2006">
-        <mc:Choice xmlns:a14="http://schemas.microsoft.com/office/drawing/2010/main" Requires="a14">
+      <mc:AlternateContent xmlns:mc="http://schemas.openxmlformats.org/markup-compatibility/2006" xmlns:a14="http://schemas.microsoft.com/office/drawing/2010/main">
+        <mc:Choice Requires="a14">
           <p:sp>
             <p:nvSpPr>
               <p:cNvPr id="14" name="Rectangle 13">
@@ -4563,6 +4589,7 @@
               </a:bodyPr>
               <a:lstStyle/>
               <a:p>
+                <a:pPr/>
                 <a14:m>
                   <m:oMathPara xmlns:m="http://schemas.openxmlformats.org/officeDocument/2006/math">
                     <m:oMathParaPr>
@@ -4707,7 +4734,7 @@
             </p:txBody>
           </p:sp>
         </mc:Choice>
-        <mc:Fallback>
+        <mc:Fallback xmlns="">
           <p:sp>
             <p:nvSpPr>
               <p:cNvPr id="14" name="Rectangle 13">
@@ -4884,10 +4911,10 @@
       </p:grpSpPr>
       <p:sp>
         <p:nvSpPr>
-          <p:cNvPr id="2" name="Title 1">
-            <a:extLst>
-              <a:ext uri="{FF2B5EF4-FFF2-40B4-BE49-F238E27FC236}">
-                <a16:creationId xmlns:a16="http://schemas.microsoft.com/office/drawing/2014/main" id="{863D8525-B8F2-462E-B323-D094C2F3DBFF}"/>
+          <p:cNvPr id="6" name="Title 5">
+            <a:extLst>
+              <a:ext uri="{FF2B5EF4-FFF2-40B4-BE49-F238E27FC236}">
+                <a16:creationId xmlns:a16="http://schemas.microsoft.com/office/drawing/2014/main" id="{FE23C14E-3340-47B4-81EE-84B65AB3DBF5}"/>
               </a:ext>
             </a:extLst>
           </p:cNvPr>
@@ -4905,17 +4932,17 @@
           <a:p>
             <a:r>
               <a:rPr lang="en-US" dirty="0"/>
-              <a:t>Results and Discussion</a:t>
-            </a:r>
-          </a:p>
-        </p:txBody>
-      </p:sp>
-      <p:sp>
-        <p:nvSpPr>
-          <p:cNvPr id="3" name="Text Placeholder 2">
-            <a:extLst>
-              <a:ext uri="{FF2B5EF4-FFF2-40B4-BE49-F238E27FC236}">
-                <a16:creationId xmlns:a16="http://schemas.microsoft.com/office/drawing/2014/main" id="{74790C9B-17F4-4B25-955E-F948E1AA44B8}"/>
+              <a:t>E-Guidance and APDG Implementation</a:t>
+            </a:r>
+          </a:p>
+        </p:txBody>
+      </p:sp>
+      <p:sp>
+        <p:nvSpPr>
+          <p:cNvPr id="7" name="Text Placeholder 6">
+            <a:extLst>
+              <a:ext uri="{FF2B5EF4-FFF2-40B4-BE49-F238E27FC236}">
+                <a16:creationId xmlns:a16="http://schemas.microsoft.com/office/drawing/2014/main" id="{C8C94B83-7731-48C3-88FB-3A42303B8F94}"/>
               </a:ext>
             </a:extLst>
           </p:cNvPr>
@@ -4931,16 +4958,52 @@
           <a:bodyPr/>
           <a:lstStyle/>
           <a:p>
-            <a:endParaRPr lang="en-US"/>
-          </a:p>
-        </p:txBody>
-      </p:sp>
-      <p:sp>
-        <p:nvSpPr>
-          <p:cNvPr id="4" name="Slide Number Placeholder 3">
-            <a:extLst>
-              <a:ext uri="{FF2B5EF4-FFF2-40B4-BE49-F238E27FC236}">
-                <a16:creationId xmlns:a16="http://schemas.microsoft.com/office/drawing/2014/main" id="{22C9336B-DF26-49FD-8F2D-4E9398179DD1}"/>
+            <a:r>
+              <a:rPr lang="en-US" dirty="0"/>
+              <a:t>E-Guidance</a:t>
+            </a:r>
+          </a:p>
+        </p:txBody>
+      </p:sp>
+      <p:sp>
+        <p:nvSpPr>
+          <p:cNvPr id="9" name="Text Placeholder 8">
+            <a:extLst>
+              <a:ext uri="{FF2B5EF4-FFF2-40B4-BE49-F238E27FC236}">
+                <a16:creationId xmlns:a16="http://schemas.microsoft.com/office/drawing/2014/main" id="{3BA37D59-D43B-4C13-B779-FE293CCEEA52}"/>
+              </a:ext>
+            </a:extLst>
+          </p:cNvPr>
+          <p:cNvSpPr>
+            <a:spLocks noGrp="1"/>
+          </p:cNvSpPr>
+          <p:nvPr>
+            <p:ph type="body" sz="quarter" idx="3"/>
+          </p:nvPr>
+        </p:nvSpPr>
+        <p:spPr>
+          <a:xfrm>
+            <a:off x="9650026" y="1681163"/>
+            <a:ext cx="1705361" cy="823912"/>
+          </a:xfrm>
+        </p:spPr>
+        <p:txBody>
+          <a:bodyPr/>
+          <a:lstStyle/>
+          <a:p>
+            <a:r>
+              <a:rPr lang="en-US" dirty="0"/>
+              <a:t>APDG</a:t>
+            </a:r>
+          </a:p>
+        </p:txBody>
+      </p:sp>
+      <p:sp>
+        <p:nvSpPr>
+          <p:cNvPr id="5" name="Slide Number Placeholder 4">
+            <a:extLst>
+              <a:ext uri="{FF2B5EF4-FFF2-40B4-BE49-F238E27FC236}">
+                <a16:creationId xmlns:a16="http://schemas.microsoft.com/office/drawing/2014/main" id="{50EDFF45-E454-4500-9013-9D646DD2FCC4}"/>
               </a:ext>
             </a:extLst>
           </p:cNvPr>
@@ -4964,10 +5027,170 @@
           </a:p>
         </p:txBody>
       </p:sp>
+      <p:pic>
+        <p:nvPicPr>
+          <p:cNvPr id="11" name="Picture 10">
+            <a:extLst>
+              <a:ext uri="{FF2B5EF4-FFF2-40B4-BE49-F238E27FC236}">
+                <a16:creationId xmlns:a16="http://schemas.microsoft.com/office/drawing/2014/main" id="{8BA64A62-525F-4429-BFC1-4F1A139AC9A6}"/>
+              </a:ext>
+            </a:extLst>
+          </p:cNvPr>
+          <p:cNvPicPr>
+            <a:picLocks noChangeAspect="1"/>
+          </p:cNvPicPr>
+          <p:nvPr/>
+        </p:nvPicPr>
+        <p:blipFill>
+          <a:blip r:embed="rId2"/>
+          <a:stretch>
+            <a:fillRect/>
+          </a:stretch>
+        </p:blipFill>
+        <p:spPr>
+          <a:xfrm>
+            <a:off x="836612" y="2405062"/>
+            <a:ext cx="2505075" cy="914400"/>
+          </a:xfrm>
+          <a:prstGeom prst="rect">
+            <a:avLst/>
+          </a:prstGeom>
+        </p:spPr>
+      </p:pic>
+      <p:pic>
+        <p:nvPicPr>
+          <p:cNvPr id="12" name="Picture 11">
+            <a:extLst>
+              <a:ext uri="{FF2B5EF4-FFF2-40B4-BE49-F238E27FC236}">
+                <a16:creationId xmlns:a16="http://schemas.microsoft.com/office/drawing/2014/main" id="{9AD823F7-2748-4CA6-9CAE-958F0467BDB1}"/>
+              </a:ext>
+            </a:extLst>
+          </p:cNvPr>
+          <p:cNvPicPr>
+            <a:picLocks noChangeAspect="1"/>
+          </p:cNvPicPr>
+          <p:nvPr/>
+        </p:nvPicPr>
+        <p:blipFill>
+          <a:blip r:embed="rId3"/>
+          <a:stretch>
+            <a:fillRect/>
+          </a:stretch>
+        </p:blipFill>
+        <p:spPr>
+          <a:xfrm>
+            <a:off x="983710" y="3429000"/>
+            <a:ext cx="3228975" cy="866775"/>
+          </a:xfrm>
+          <a:prstGeom prst="rect">
+            <a:avLst/>
+          </a:prstGeom>
+        </p:spPr>
+      </p:pic>
+      <p:pic>
+        <p:nvPicPr>
+          <p:cNvPr id="13" name="Picture 12">
+            <a:extLst>
+              <a:ext uri="{FF2B5EF4-FFF2-40B4-BE49-F238E27FC236}">
+                <a16:creationId xmlns:a16="http://schemas.microsoft.com/office/drawing/2014/main" id="{52AF92E5-3ED4-4F8B-BB1A-7663CCA9E917}"/>
+              </a:ext>
+            </a:extLst>
+          </p:cNvPr>
+          <p:cNvPicPr>
+            <a:picLocks noChangeAspect="1"/>
+          </p:cNvPicPr>
+          <p:nvPr/>
+        </p:nvPicPr>
+        <p:blipFill>
+          <a:blip r:embed="rId4"/>
+          <a:stretch>
+            <a:fillRect/>
+          </a:stretch>
+        </p:blipFill>
+        <p:spPr>
+          <a:xfrm>
+            <a:off x="5524500" y="2862262"/>
+            <a:ext cx="5829300" cy="1257300"/>
+          </a:xfrm>
+          <a:prstGeom prst="rect">
+            <a:avLst/>
+          </a:prstGeom>
+        </p:spPr>
+      </p:pic>
+      <p:sp>
+        <p:nvSpPr>
+          <p:cNvPr id="14" name="TextBox 13">
+            <a:extLst>
+              <a:ext uri="{FF2B5EF4-FFF2-40B4-BE49-F238E27FC236}">
+                <a16:creationId xmlns:a16="http://schemas.microsoft.com/office/drawing/2014/main" id="{9C6B4231-42AE-4E75-8E65-96AE5FB8B2F5}"/>
+              </a:ext>
+            </a:extLst>
+          </p:cNvPr>
+          <p:cNvSpPr txBox="1"/>
+          <p:nvPr/>
+        </p:nvSpPr>
+        <p:spPr>
+          <a:xfrm>
+            <a:off x="836612" y="5035580"/>
+            <a:ext cx="4418969" cy="1477328"/>
+          </a:xfrm>
+          <a:prstGeom prst="rect">
+            <a:avLst/>
+          </a:prstGeom>
+          <a:noFill/>
+        </p:spPr>
+        <p:txBody>
+          <a:bodyPr wrap="square" rtlCol="0">
+            <a:spAutoFit/>
+          </a:bodyPr>
+          <a:lstStyle/>
+          <a:p>
+            <a:r>
+              <a:rPr lang="en-US" dirty="0"/>
+              <a:t>The E matrix, the inverted matrix forming the linear system from the equations of motion, gives E-Guidance its name. Each axis of motion is solved independently, resulting in a total of 6 at each guidance update</a:t>
+            </a:r>
+          </a:p>
+        </p:txBody>
+      </p:sp>
+      <p:sp>
+        <p:nvSpPr>
+          <p:cNvPr id="15" name="TextBox 14">
+            <a:extLst>
+              <a:ext uri="{FF2B5EF4-FFF2-40B4-BE49-F238E27FC236}">
+                <a16:creationId xmlns:a16="http://schemas.microsoft.com/office/drawing/2014/main" id="{34F75BAE-D68E-4071-B592-EB36DAB4EA13}"/>
+              </a:ext>
+            </a:extLst>
+          </p:cNvPr>
+          <p:cNvSpPr txBox="1"/>
+          <p:nvPr/>
+        </p:nvSpPr>
+        <p:spPr>
+          <a:xfrm>
+            <a:off x="6936421" y="5035580"/>
+            <a:ext cx="4418969" cy="1200329"/>
+          </a:xfrm>
+          <a:prstGeom prst="rect">
+            <a:avLst/>
+          </a:prstGeom>
+          <a:noFill/>
+        </p:spPr>
+        <p:txBody>
+          <a:bodyPr wrap="square" rtlCol="0">
+            <a:spAutoFit/>
+          </a:bodyPr>
+          <a:lstStyle/>
+          <a:p>
+            <a:r>
+              <a:rPr lang="en-US" dirty="0"/>
+              <a:t>APDG forms a similar linear system in 3 unknowns per axis, resulting in the above 3 equations for a total of 9 at each guidance update.</a:t>
+            </a:r>
+          </a:p>
+        </p:txBody>
+      </p:sp>
     </p:spTree>
     <p:extLst>
       <p:ext uri="{BB962C8B-B14F-4D97-AF65-F5344CB8AC3E}">
-        <p14:creationId xmlns:p14="http://schemas.microsoft.com/office/powerpoint/2010/main" val="1583861834"/>
+        <p14:creationId xmlns:p14="http://schemas.microsoft.com/office/powerpoint/2010/main" val="62476696"/>
       </p:ext>
     </p:extLst>
   </p:cSld>
@@ -4999,7 +5222,7 @@
           <p:cNvPr id="2" name="Title 1">
             <a:extLst>
               <a:ext uri="{FF2B5EF4-FFF2-40B4-BE49-F238E27FC236}">
-                <a16:creationId xmlns:a16="http://schemas.microsoft.com/office/drawing/2014/main" id="{DCB2E18E-2F7E-4062-B4E1-0B1A59E3EB8A}"/>
+                <a16:creationId xmlns:a16="http://schemas.microsoft.com/office/drawing/2014/main" id="{767D9DEE-321E-4D17-9357-E25479A3D501}"/>
               </a:ext>
             </a:extLst>
           </p:cNvPr>
@@ -5017,42 +5240,172 @@
           <a:p>
             <a:r>
               <a:rPr lang="en-US" dirty="0"/>
-              <a:t>Future Work</a:t>
-            </a:r>
-          </a:p>
-        </p:txBody>
-      </p:sp>
-      <p:sp>
-        <p:nvSpPr>
-          <p:cNvPr id="3" name="Text Placeholder 2">
-            <a:extLst>
-              <a:ext uri="{FF2B5EF4-FFF2-40B4-BE49-F238E27FC236}">
-                <a16:creationId xmlns:a16="http://schemas.microsoft.com/office/drawing/2014/main" id="{FD8599A4-623D-4C8F-80C3-4BDDA15FF090}"/>
-              </a:ext>
-            </a:extLst>
-          </p:cNvPr>
-          <p:cNvSpPr>
-            <a:spLocks noGrp="1"/>
-          </p:cNvSpPr>
-          <p:nvPr>
-            <p:ph type="body" idx="1"/>
-          </p:nvPr>
-        </p:nvSpPr>
-        <p:spPr/>
-        <p:txBody>
-          <a:bodyPr/>
-          <a:lstStyle/>
-          <a:p>
-            <a:endParaRPr lang="en-US"/>
-          </a:p>
-        </p:txBody>
-      </p:sp>
-      <p:sp>
-        <p:nvSpPr>
-          <p:cNvPr id="4" name="Slide Number Placeholder 3">
-            <a:extLst>
-              <a:ext uri="{FF2B5EF4-FFF2-40B4-BE49-F238E27FC236}">
-                <a16:creationId xmlns:a16="http://schemas.microsoft.com/office/drawing/2014/main" id="{35BC314C-9E9B-43BF-BB8B-81996365F20F}"/>
+              <a:t>E-Guidance as Optimal Control</a:t>
+            </a:r>
+          </a:p>
+        </p:txBody>
+      </p:sp>
+      <p:pic>
+        <p:nvPicPr>
+          <p:cNvPr id="7" name="Content Placeholder 6">
+            <a:extLst>
+              <a:ext uri="{FF2B5EF4-FFF2-40B4-BE49-F238E27FC236}">
+                <a16:creationId xmlns:a16="http://schemas.microsoft.com/office/drawing/2014/main" id="{4C63D243-40C4-48F9-B5A1-ACE5612382CD}"/>
+              </a:ext>
+            </a:extLst>
+          </p:cNvPr>
+          <p:cNvPicPr>
+            <a:picLocks noGrp="1" noChangeAspect="1"/>
+          </p:cNvPicPr>
+          <p:nvPr>
+            <p:ph idx="1"/>
+          </p:nvPr>
+        </p:nvPicPr>
+        <p:blipFill>
+          <a:blip r:embed="rId2"/>
+          <a:stretch>
+            <a:fillRect/>
+          </a:stretch>
+        </p:blipFill>
+        <p:spPr>
+          <a:xfrm>
+            <a:off x="7013359" y="2777786"/>
+            <a:ext cx="3224860" cy="859417"/>
+          </a:xfrm>
+          <a:prstGeom prst="rect">
+            <a:avLst/>
+          </a:prstGeom>
+        </p:spPr>
+      </p:pic>
+      <mc:AlternateContent xmlns:mc="http://schemas.openxmlformats.org/markup-compatibility/2006" xmlns:a14="http://schemas.microsoft.com/office/drawing/2010/main">
+        <mc:Choice Requires="a14">
+          <p:sp>
+            <p:nvSpPr>
+              <p:cNvPr id="4" name="Text Placeholder 3">
+                <a:extLst>
+                  <a:ext uri="{FF2B5EF4-FFF2-40B4-BE49-F238E27FC236}">
+                    <a16:creationId xmlns:a16="http://schemas.microsoft.com/office/drawing/2014/main" id="{34AD620D-D301-4DF7-99EC-F19644CB47D3}"/>
+                  </a:ext>
+                </a:extLst>
+              </p:cNvPr>
+              <p:cNvSpPr>
+                <a:spLocks noGrp="1"/>
+              </p:cNvSpPr>
+              <p:nvPr>
+                <p:ph type="body" sz="half" idx="2"/>
+              </p:nvPr>
+            </p:nvSpPr>
+            <p:spPr/>
+            <p:txBody>
+              <a:bodyPr/>
+              <a:lstStyle/>
+              <a:p>
+                <a:pPr marL="285750" indent="-285750">
+                  <a:buFont typeface="Arial" panose="020B0604020202020204" pitchFamily="34" charset="0"/>
+                  <a:buChar char="•"/>
+                </a:pPr>
+                <a:r>
+                  <a:rPr lang="en-US" dirty="0"/>
+                  <a:t>E-Guidance is not fuel optimal, but is the solution to an optimal control problem with a different performance index</a:t>
+                </a:r>
+              </a:p>
+              <a:p>
+                <a:pPr marL="285750" indent="-285750">
+                  <a:buFont typeface="Arial" panose="020B0604020202020204" pitchFamily="34" charset="0"/>
+                  <a:buChar char="•"/>
+                </a:pPr>
+                <a:r>
+                  <a:rPr lang="en-US" dirty="0"/>
+                  <a:t>The index does penalize large thrust magnitudes and the solution has been shown to give good performance</a:t>
+                </a:r>
+              </a:p>
+              <a:p>
+                <a:pPr marL="285750" indent="-285750">
+                  <a:buFont typeface="Arial" panose="020B0604020202020204" pitchFamily="34" charset="0"/>
+                  <a:buChar char="•"/>
+                </a:pPr>
+                <a:r>
+                  <a:rPr lang="en-US" dirty="0"/>
+                  <a:t>Applying optimal control theory (maximizing the Hamiltonian H) results in a command </a:t>
+                </a:r>
+                <a14:m>
+                  <m:oMath xmlns:m="http://schemas.openxmlformats.org/officeDocument/2006/math">
+                    <m:r>
+                      <a:rPr lang="en-US" b="1" i="1" smtClean="0">
+                        <a:latin typeface="Cambria Math" panose="02040503050406030204" pitchFamily="18" charset="0"/>
+                      </a:rPr>
+                      <m:t>𝒖</m:t>
+                    </m:r>
+                  </m:oMath>
+                </a14:m>
+                <a:r>
+                  <a:rPr lang="en-US" b="1" i="1" dirty="0"/>
+                  <a:t> </a:t>
+                </a:r>
+                <a:r>
+                  <a:rPr lang="en-US" dirty="0"/>
+                  <a:t>of the same form as E-Guidance</a:t>
+                </a:r>
+              </a:p>
+              <a:p>
+                <a:pPr marL="285750" indent="-285750">
+                  <a:buFont typeface="Arial" panose="020B0604020202020204" pitchFamily="34" charset="0"/>
+                  <a:buChar char="•"/>
+                </a:pPr>
+                <a:r>
+                  <a:rPr lang="en-US" dirty="0"/>
+                  <a:t>APDG may not minimize the same cost function but is shown to provide similar fuel performance</a:t>
+                </a:r>
+              </a:p>
+            </p:txBody>
+          </p:sp>
+        </mc:Choice>
+        <mc:Fallback xmlns="">
+          <p:sp>
+            <p:nvSpPr>
+              <p:cNvPr id="4" name="Text Placeholder 3">
+                <a:extLst>
+                  <a:ext uri="{FF2B5EF4-FFF2-40B4-BE49-F238E27FC236}">
+                    <a16:creationId xmlns:a16="http://schemas.microsoft.com/office/drawing/2014/main" id="{34AD620D-D301-4DF7-99EC-F19644CB47D3}"/>
+                  </a:ext>
+                </a:extLst>
+              </p:cNvPr>
+              <p:cNvSpPr>
+                <a:spLocks noGrp="1" noRot="1" noChangeAspect="1" noMove="1" noResize="1" noEditPoints="1" noAdjustHandles="1" noChangeArrowheads="1" noChangeShapeType="1" noTextEdit="1"/>
+              </p:cNvSpPr>
+              <p:nvPr>
+                <p:ph type="body" sz="half" idx="2"/>
+              </p:nvPr>
+            </p:nvSpPr>
+            <p:spPr>
+              <a:blipFill>
+                <a:blip r:embed="rId3"/>
+                <a:stretch>
+                  <a:fillRect l="-620" t="-1120"/>
+                </a:stretch>
+              </a:blipFill>
+            </p:spPr>
+            <p:txBody>
+              <a:bodyPr/>
+              <a:lstStyle/>
+              <a:p>
+                <a:r>
+                  <a:rPr lang="en-US">
+                    <a:noFill/>
+                  </a:rPr>
+                  <a:t> </a:t>
+                </a:r>
+              </a:p>
+            </p:txBody>
+          </p:sp>
+        </mc:Fallback>
+      </mc:AlternateContent>
+      <p:sp>
+        <p:nvSpPr>
+          <p:cNvPr id="5" name="Slide Number Placeholder 4">
+            <a:extLst>
+              <a:ext uri="{FF2B5EF4-FFF2-40B4-BE49-F238E27FC236}">
+                <a16:creationId xmlns:a16="http://schemas.microsoft.com/office/drawing/2014/main" id="{D26AEBE6-73EF-4DB9-AF6F-25CBF046EBD8}"/>
               </a:ext>
             </a:extLst>
           </p:cNvPr>
@@ -5071,6 +5424,2865 @@
             <a:fld id="{883A1948-8D50-4BC1-A052-3D414D62852E}" type="slidenum">
               <a:rPr lang="en-US" smtClean="0"/>
               <a:t>12</a:t>
+            </a:fld>
+            <a:endParaRPr lang="en-US"/>
+          </a:p>
+        </p:txBody>
+      </p:sp>
+      <p:pic>
+        <p:nvPicPr>
+          <p:cNvPr id="6" name="Picture 5">
+            <a:extLst>
+              <a:ext uri="{FF2B5EF4-FFF2-40B4-BE49-F238E27FC236}">
+                <a16:creationId xmlns:a16="http://schemas.microsoft.com/office/drawing/2014/main" id="{11FEE973-CBD7-4B62-84EA-0C608BADE5E1}"/>
+              </a:ext>
+            </a:extLst>
+          </p:cNvPr>
+          <p:cNvPicPr>
+            <a:picLocks noChangeAspect="1"/>
+          </p:cNvPicPr>
+          <p:nvPr/>
+        </p:nvPicPr>
+        <p:blipFill>
+          <a:blip r:embed="rId4"/>
+          <a:stretch>
+            <a:fillRect/>
+          </a:stretch>
+        </p:blipFill>
+        <p:spPr>
+          <a:xfrm>
+            <a:off x="7003285" y="1871827"/>
+            <a:ext cx="2036818" cy="859417"/>
+          </a:xfrm>
+          <a:prstGeom prst="rect">
+            <a:avLst/>
+          </a:prstGeom>
+        </p:spPr>
+      </p:pic>
+      <p:sp>
+        <p:nvSpPr>
+          <p:cNvPr id="8" name="TextBox 7">
+            <a:extLst>
+              <a:ext uri="{FF2B5EF4-FFF2-40B4-BE49-F238E27FC236}">
+                <a16:creationId xmlns:a16="http://schemas.microsoft.com/office/drawing/2014/main" id="{2359AFEF-7CCD-440D-A605-4263E7E007F1}"/>
+              </a:ext>
+            </a:extLst>
+          </p:cNvPr>
+          <p:cNvSpPr txBox="1"/>
+          <p:nvPr/>
+        </p:nvSpPr>
+        <p:spPr>
+          <a:xfrm>
+            <a:off x="5372597" y="2116870"/>
+            <a:ext cx="1446806" cy="369332"/>
+          </a:xfrm>
+          <a:prstGeom prst="rect">
+            <a:avLst/>
+          </a:prstGeom>
+          <a:noFill/>
+        </p:spPr>
+        <p:txBody>
+          <a:bodyPr wrap="none" rtlCol="0">
+            <a:spAutoFit/>
+          </a:bodyPr>
+          <a:lstStyle/>
+          <a:p>
+            <a:r>
+              <a:rPr lang="en-US" dirty="0"/>
+              <a:t>Fuel Optimal:</a:t>
+            </a:r>
+          </a:p>
+        </p:txBody>
+      </p:sp>
+      <p:sp>
+        <p:nvSpPr>
+          <p:cNvPr id="10" name="TextBox 9">
+            <a:extLst>
+              <a:ext uri="{FF2B5EF4-FFF2-40B4-BE49-F238E27FC236}">
+                <a16:creationId xmlns:a16="http://schemas.microsoft.com/office/drawing/2014/main" id="{BF79ADC0-4850-4030-9399-6CC2DF7DDBDD}"/>
+              </a:ext>
+            </a:extLst>
+          </p:cNvPr>
+          <p:cNvSpPr txBox="1"/>
+          <p:nvPr/>
+        </p:nvSpPr>
+        <p:spPr>
+          <a:xfrm>
+            <a:off x="5372597" y="3022828"/>
+            <a:ext cx="1255472" cy="369332"/>
+          </a:xfrm>
+          <a:prstGeom prst="rect">
+            <a:avLst/>
+          </a:prstGeom>
+          <a:noFill/>
+        </p:spPr>
+        <p:txBody>
+          <a:bodyPr wrap="none" rtlCol="0">
+            <a:spAutoFit/>
+          </a:bodyPr>
+          <a:lstStyle/>
+          <a:p>
+            <a:r>
+              <a:rPr lang="en-US" dirty="0"/>
+              <a:t>E-Guidance</a:t>
+            </a:r>
+          </a:p>
+        </p:txBody>
+      </p:sp>
+      <p:pic>
+        <p:nvPicPr>
+          <p:cNvPr id="12" name="Picture 11">
+            <a:extLst>
+              <a:ext uri="{FF2B5EF4-FFF2-40B4-BE49-F238E27FC236}">
+                <a16:creationId xmlns:a16="http://schemas.microsoft.com/office/drawing/2014/main" id="{4113201D-440E-4C8F-8131-A5B93F7D4AA9}"/>
+              </a:ext>
+            </a:extLst>
+          </p:cNvPr>
+          <p:cNvPicPr>
+            <a:picLocks noChangeAspect="1"/>
+          </p:cNvPicPr>
+          <p:nvPr/>
+        </p:nvPicPr>
+        <p:blipFill>
+          <a:blip r:embed="rId5"/>
+          <a:stretch>
+            <a:fillRect/>
+          </a:stretch>
+        </p:blipFill>
+        <p:spPr>
+          <a:xfrm>
+            <a:off x="5372597" y="3637203"/>
+            <a:ext cx="3464019" cy="2375015"/>
+          </a:xfrm>
+          <a:prstGeom prst="rect">
+            <a:avLst/>
+          </a:prstGeom>
+        </p:spPr>
+      </p:pic>
+      <p:pic>
+        <p:nvPicPr>
+          <p:cNvPr id="13" name="Picture 12">
+            <a:extLst>
+              <a:ext uri="{FF2B5EF4-FFF2-40B4-BE49-F238E27FC236}">
+                <a16:creationId xmlns:a16="http://schemas.microsoft.com/office/drawing/2014/main" id="{D76E37BF-CC5D-412B-8D45-CE2AEA4EC666}"/>
+              </a:ext>
+            </a:extLst>
+          </p:cNvPr>
+          <p:cNvPicPr>
+            <a:picLocks noChangeAspect="1"/>
+          </p:cNvPicPr>
+          <p:nvPr/>
+        </p:nvPicPr>
+        <p:blipFill>
+          <a:blip r:embed="rId6"/>
+          <a:stretch>
+            <a:fillRect/>
+          </a:stretch>
+        </p:blipFill>
+        <p:spPr>
+          <a:xfrm>
+            <a:off x="9040103" y="3796506"/>
+            <a:ext cx="1533525" cy="333375"/>
+          </a:xfrm>
+          <a:prstGeom prst="rect">
+            <a:avLst/>
+          </a:prstGeom>
+        </p:spPr>
+      </p:pic>
+      <p:pic>
+        <p:nvPicPr>
+          <p:cNvPr id="14" name="Picture 13">
+            <a:extLst>
+              <a:ext uri="{FF2B5EF4-FFF2-40B4-BE49-F238E27FC236}">
+                <a16:creationId xmlns:a16="http://schemas.microsoft.com/office/drawing/2014/main" id="{949F255B-BE6C-4AED-8C81-45708201AE6F}"/>
+              </a:ext>
+            </a:extLst>
+          </p:cNvPr>
+          <p:cNvPicPr>
+            <a:picLocks noChangeAspect="1"/>
+          </p:cNvPicPr>
+          <p:nvPr/>
+        </p:nvPicPr>
+        <p:blipFill>
+          <a:blip r:embed="rId7"/>
+          <a:stretch>
+            <a:fillRect/>
+          </a:stretch>
+        </p:blipFill>
+        <p:spPr>
+          <a:xfrm>
+            <a:off x="8992477" y="4240650"/>
+            <a:ext cx="1628775" cy="466725"/>
+          </a:xfrm>
+          <a:prstGeom prst="rect">
+            <a:avLst/>
+          </a:prstGeom>
+        </p:spPr>
+      </p:pic>
+    </p:spTree>
+    <p:extLst>
+      <p:ext uri="{BB962C8B-B14F-4D97-AF65-F5344CB8AC3E}">
+        <p14:creationId xmlns:p14="http://schemas.microsoft.com/office/powerpoint/2010/main" val="155206612"/>
+      </p:ext>
+    </p:extLst>
+  </p:cSld>
+  <p:clrMapOvr>
+    <a:masterClrMapping/>
+  </p:clrMapOvr>
+</p:sld>
+</file>
+
+<file path=ppt/slides/slide13.xml><?xml version="1.0" encoding="utf-8"?>
+<p:sld xmlns:a="http://schemas.openxmlformats.org/drawingml/2006/main" xmlns:r="http://schemas.openxmlformats.org/officeDocument/2006/relationships" xmlns:p="http://schemas.openxmlformats.org/presentationml/2006/main">
+  <p:cSld>
+    <p:spTree>
+      <p:nvGrpSpPr>
+        <p:cNvPr id="1" name=""/>
+        <p:cNvGrpSpPr/>
+        <p:nvPr/>
+      </p:nvGrpSpPr>
+      <p:grpSpPr>
+        <a:xfrm>
+          <a:off x="0" y="0"/>
+          <a:ext cx="0" cy="0"/>
+          <a:chOff x="0" y="0"/>
+          <a:chExt cx="0" cy="0"/>
+        </a:xfrm>
+      </p:grpSpPr>
+      <p:sp>
+        <p:nvSpPr>
+          <p:cNvPr id="6" name="Title 5">
+            <a:extLst>
+              <a:ext uri="{FF2B5EF4-FFF2-40B4-BE49-F238E27FC236}">
+                <a16:creationId xmlns:a16="http://schemas.microsoft.com/office/drawing/2014/main" id="{1CB5C5FE-5F34-4DC3-9578-9D46F4F2C8E9}"/>
+              </a:ext>
+            </a:extLst>
+          </p:cNvPr>
+          <p:cNvSpPr>
+            <a:spLocks noGrp="1"/>
+          </p:cNvSpPr>
+          <p:nvPr>
+            <p:ph type="title"/>
+          </p:nvPr>
+        </p:nvSpPr>
+        <p:spPr/>
+        <p:txBody>
+          <a:bodyPr/>
+          <a:lstStyle/>
+          <a:p>
+            <a:r>
+              <a:rPr lang="en-US" dirty="0"/>
+              <a:t>Time-to-go</a:t>
+            </a:r>
+          </a:p>
+        </p:txBody>
+      </p:sp>
+      <mc:AlternateContent xmlns:mc="http://schemas.openxmlformats.org/markup-compatibility/2006">
+        <mc:Choice xmlns:a14="http://schemas.microsoft.com/office/drawing/2010/main" Requires="a14">
+          <p:sp>
+            <p:nvSpPr>
+              <p:cNvPr id="8" name="Text Placeholder 7">
+                <a:extLst>
+                  <a:ext uri="{FF2B5EF4-FFF2-40B4-BE49-F238E27FC236}">
+                    <a16:creationId xmlns:a16="http://schemas.microsoft.com/office/drawing/2014/main" id="{FA3E3714-C5AB-4276-B4AB-EB5855E6D048}"/>
+                  </a:ext>
+                </a:extLst>
+              </p:cNvPr>
+              <p:cNvSpPr>
+                <a:spLocks noGrp="1"/>
+              </p:cNvSpPr>
+              <p:nvPr>
+                <p:ph type="body" sz="half" idx="2"/>
+              </p:nvPr>
+            </p:nvSpPr>
+            <p:spPr/>
+            <p:txBody>
+              <a:bodyPr>
+                <a:normAutofit fontScale="92500" lnSpcReduction="20000"/>
+              </a:bodyPr>
+              <a:lstStyle/>
+              <a:p>
+                <a:pPr marL="285750" indent="-285750">
+                  <a:buFont typeface="Arial" panose="020B0604020202020204" pitchFamily="34" charset="0"/>
+                  <a:buChar char="•"/>
+                </a:pPr>
+                <a:r>
+                  <a:rPr lang="en-US" dirty="0"/>
+                  <a:t>The E-matrix for APDG relies upon a time-to-go estimate </a:t>
+                </a:r>
+                <a14:m>
+                  <m:oMath xmlns:m="http://schemas.openxmlformats.org/officeDocument/2006/math">
+                    <m:sSub>
+                      <m:sSubPr>
+                        <m:ctrlPr>
+                          <a:rPr lang="en-US" b="0" i="1" smtClean="0">
+                            <a:latin typeface="Cambria Math" panose="02040503050406030204" pitchFamily="18" charset="0"/>
+                          </a:rPr>
+                        </m:ctrlPr>
+                      </m:sSubPr>
+                      <m:e>
+                        <m:r>
+                          <a:rPr lang="en-US" b="0" i="1" smtClean="0">
+                            <a:latin typeface="Cambria Math" panose="02040503050406030204" pitchFamily="18" charset="0"/>
+                          </a:rPr>
+                          <m:t>𝑡</m:t>
+                        </m:r>
+                      </m:e>
+                      <m:sub>
+                        <m:r>
+                          <a:rPr lang="en-US" b="0" i="1" smtClean="0">
+                            <a:latin typeface="Cambria Math" panose="02040503050406030204" pitchFamily="18" charset="0"/>
+                          </a:rPr>
+                          <m:t>𝑔𝑜</m:t>
+                        </m:r>
+                      </m:sub>
+                    </m:sSub>
+                  </m:oMath>
+                </a14:m>
+                <a:r>
+                  <a:rPr lang="en-US" dirty="0"/>
+                  <a:t> which is not addressed by the optimal control solution. The Apollo missions used an iterative method which had to allow for manual landing site </a:t>
+                </a:r>
+                <a:r>
+                  <a:rPr lang="en-US" dirty="0" err="1"/>
+                  <a:t>redesignation</a:t>
+                </a:r>
+                <a:r>
+                  <a:rPr lang="en-US" dirty="0"/>
+                  <a:t> and relied upon pre-mission planning. Many </a:t>
+                </a:r>
+                <a14:m>
+                  <m:oMath xmlns:m="http://schemas.openxmlformats.org/officeDocument/2006/math">
+                    <m:sSub>
+                      <m:sSubPr>
+                        <m:ctrlPr>
+                          <a:rPr lang="en-US" i="1">
+                            <a:latin typeface="Cambria Math" panose="02040503050406030204" pitchFamily="18" charset="0"/>
+                          </a:rPr>
+                        </m:ctrlPr>
+                      </m:sSubPr>
+                      <m:e>
+                        <m:r>
+                          <a:rPr lang="en-US" i="1">
+                            <a:latin typeface="Cambria Math" panose="02040503050406030204" pitchFamily="18" charset="0"/>
+                          </a:rPr>
+                          <m:t>𝑡</m:t>
+                        </m:r>
+                      </m:e>
+                      <m:sub>
+                        <m:r>
+                          <a:rPr lang="en-US" i="1">
+                            <a:latin typeface="Cambria Math" panose="02040503050406030204" pitchFamily="18" charset="0"/>
+                          </a:rPr>
+                          <m:t>𝑔𝑜</m:t>
+                        </m:r>
+                      </m:sub>
+                    </m:sSub>
+                  </m:oMath>
+                </a14:m>
+                <a:r>
+                  <a:rPr lang="en-US" dirty="0"/>
+                  <a:t> estimation methods could suffice, but since the focus of this thesis is the Adaptive PDI strategy the method used is based on performance and safety. </a:t>
+                </a:r>
+              </a:p>
+              <a:p>
+                <a:pPr marL="285750" indent="-285750">
+                  <a:buFont typeface="Arial" panose="020B0604020202020204" pitchFamily="34" charset="0"/>
+                  <a:buChar char="•"/>
+                </a:pPr>
+                <a:r>
+                  <a:rPr lang="en-US" dirty="0"/>
+                  <a:t>Citron, </a:t>
+                </a:r>
+                <a:r>
+                  <a:rPr lang="en-US" dirty="0" err="1"/>
+                  <a:t>Dunin</a:t>
+                </a:r>
+                <a:r>
+                  <a:rPr lang="en-US" dirty="0"/>
+                  <a:t>, and </a:t>
+                </a:r>
+                <a:r>
+                  <a:rPr lang="en-US" dirty="0" err="1"/>
+                  <a:t>Meissinger</a:t>
+                </a:r>
+                <a:r>
+                  <a:rPr lang="en-US" dirty="0"/>
+                  <a:t> developed the gravity turn guidance solution, wherein the thrust vector is always opposite the velocity and velocity is zeroed upon landing. This solution cannot ensure landing at a particular site, but its time-to-go might be considered a minimum </a:t>
+                </a:r>
+                <a14:m>
+                  <m:oMath xmlns:m="http://schemas.openxmlformats.org/officeDocument/2006/math">
+                    <m:sSub>
+                      <m:sSubPr>
+                        <m:ctrlPr>
+                          <a:rPr lang="en-US" i="1">
+                            <a:latin typeface="Cambria Math" panose="02040503050406030204" pitchFamily="18" charset="0"/>
+                          </a:rPr>
+                        </m:ctrlPr>
+                      </m:sSubPr>
+                      <m:e>
+                        <m:r>
+                          <a:rPr lang="en-US" i="1">
+                            <a:latin typeface="Cambria Math" panose="02040503050406030204" pitchFamily="18" charset="0"/>
+                          </a:rPr>
+                          <m:t>𝑡</m:t>
+                        </m:r>
+                      </m:e>
+                      <m:sub>
+                        <m:r>
+                          <a:rPr lang="en-US" i="1">
+                            <a:latin typeface="Cambria Math" panose="02040503050406030204" pitchFamily="18" charset="0"/>
+                          </a:rPr>
+                          <m:t>𝑔𝑜</m:t>
+                        </m:r>
+                      </m:sub>
+                    </m:sSub>
+                  </m:oMath>
+                </a14:m>
+                <a:r>
+                  <a:rPr lang="en-US" dirty="0"/>
+                  <a:t> for a given mission. A safety margin of can added for vacuum conditions, but atmospheric conditions prove not to need adjustment even with specification of landing site.</a:t>
+                </a:r>
+              </a:p>
+            </p:txBody>
+          </p:sp>
+        </mc:Choice>
+        <mc:Fallback>
+          <p:sp>
+            <p:nvSpPr>
+              <p:cNvPr id="8" name="Text Placeholder 7">
+                <a:extLst>
+                  <a:ext uri="{FF2B5EF4-FFF2-40B4-BE49-F238E27FC236}">
+                    <a16:creationId xmlns:a16="http://schemas.microsoft.com/office/drawing/2014/main" id="{FA3E3714-C5AB-4276-B4AB-EB5855E6D048}"/>
+                  </a:ext>
+                </a:extLst>
+              </p:cNvPr>
+              <p:cNvSpPr>
+                <a:spLocks noGrp="1" noRot="1" noChangeAspect="1" noMove="1" noResize="1" noEditPoints="1" noAdjustHandles="1" noChangeArrowheads="1" noChangeShapeType="1" noTextEdit="1"/>
+              </p:cNvSpPr>
+              <p:nvPr>
+                <p:ph type="body" sz="half" idx="2"/>
+              </p:nvPr>
+            </p:nvSpPr>
+            <p:spPr>
+              <a:blipFill>
+                <a:blip r:embed="rId2"/>
+                <a:stretch>
+                  <a:fillRect l="-465" t="-1920" r="-1550" b="-1120"/>
+                </a:stretch>
+              </a:blipFill>
+            </p:spPr>
+            <p:txBody>
+              <a:bodyPr/>
+              <a:lstStyle/>
+              <a:p>
+                <a:r>
+                  <a:rPr lang="en-US">
+                    <a:noFill/>
+                  </a:rPr>
+                  <a:t> </a:t>
+                </a:r>
+              </a:p>
+            </p:txBody>
+          </p:sp>
+        </mc:Fallback>
+      </mc:AlternateContent>
+      <p:sp>
+        <p:nvSpPr>
+          <p:cNvPr id="5" name="Slide Number Placeholder 4">
+            <a:extLst>
+              <a:ext uri="{FF2B5EF4-FFF2-40B4-BE49-F238E27FC236}">
+                <a16:creationId xmlns:a16="http://schemas.microsoft.com/office/drawing/2014/main" id="{524AA791-65E6-4E8C-9F69-00D8FFECF5EF}"/>
+              </a:ext>
+            </a:extLst>
+          </p:cNvPr>
+          <p:cNvSpPr>
+            <a:spLocks noGrp="1"/>
+          </p:cNvSpPr>
+          <p:nvPr>
+            <p:ph type="sldNum" sz="quarter" idx="12"/>
+          </p:nvPr>
+        </p:nvSpPr>
+        <p:spPr/>
+        <p:txBody>
+          <a:bodyPr/>
+          <a:lstStyle/>
+          <a:p>
+            <a:fld id="{883A1948-8D50-4BC1-A052-3D414D62852E}" type="slidenum">
+              <a:rPr lang="en-US" smtClean="0"/>
+              <a:t>13</a:t>
+            </a:fld>
+            <a:endParaRPr lang="en-US"/>
+          </a:p>
+        </p:txBody>
+      </p:sp>
+      <p:pic>
+        <p:nvPicPr>
+          <p:cNvPr id="11" name="Picture 10">
+            <a:extLst>
+              <a:ext uri="{FF2B5EF4-FFF2-40B4-BE49-F238E27FC236}">
+                <a16:creationId xmlns:a16="http://schemas.microsoft.com/office/drawing/2014/main" id="{5DD73D3C-9096-4D39-91E2-85C49C2F0F25}"/>
+              </a:ext>
+            </a:extLst>
+          </p:cNvPr>
+          <p:cNvPicPr>
+            <a:picLocks noChangeAspect="1"/>
+          </p:cNvPicPr>
+          <p:nvPr/>
+        </p:nvPicPr>
+        <p:blipFill>
+          <a:blip r:embed="rId3"/>
+          <a:stretch>
+            <a:fillRect/>
+          </a:stretch>
+        </p:blipFill>
+        <p:spPr>
+          <a:xfrm>
+            <a:off x="5183188" y="1004888"/>
+            <a:ext cx="4560868" cy="4864100"/>
+          </a:xfrm>
+          <a:prstGeom prst="rect">
+            <a:avLst/>
+          </a:prstGeom>
+        </p:spPr>
+      </p:pic>
+      <p:pic>
+        <p:nvPicPr>
+          <p:cNvPr id="13" name="Picture 12">
+            <a:extLst>
+              <a:ext uri="{FF2B5EF4-FFF2-40B4-BE49-F238E27FC236}">
+                <a16:creationId xmlns:a16="http://schemas.microsoft.com/office/drawing/2014/main" id="{80258D85-4A30-416D-8F51-37062F213F83}"/>
+              </a:ext>
+            </a:extLst>
+          </p:cNvPr>
+          <p:cNvPicPr>
+            <a:picLocks noChangeAspect="1"/>
+          </p:cNvPicPr>
+          <p:nvPr/>
+        </p:nvPicPr>
+        <p:blipFill>
+          <a:blip r:embed="rId4"/>
+          <a:stretch>
+            <a:fillRect/>
+          </a:stretch>
+        </p:blipFill>
+        <p:spPr>
+          <a:xfrm>
+            <a:off x="8360520" y="4435151"/>
+            <a:ext cx="3424044" cy="688497"/>
+          </a:xfrm>
+          <a:prstGeom prst="rect">
+            <a:avLst/>
+          </a:prstGeom>
+        </p:spPr>
+      </p:pic>
+    </p:spTree>
+    <p:extLst>
+      <p:ext uri="{BB962C8B-B14F-4D97-AF65-F5344CB8AC3E}">
+        <p14:creationId xmlns:p14="http://schemas.microsoft.com/office/powerpoint/2010/main" val="92339690"/>
+      </p:ext>
+    </p:extLst>
+  </p:cSld>
+  <p:clrMapOvr>
+    <a:masterClrMapping/>
+  </p:clrMapOvr>
+</p:sld>
+</file>
+
+<file path=ppt/slides/slide14.xml><?xml version="1.0" encoding="utf-8"?>
+<p:sld xmlns:a="http://schemas.openxmlformats.org/drawingml/2006/main" xmlns:r="http://schemas.openxmlformats.org/officeDocument/2006/relationships" xmlns:p="http://schemas.openxmlformats.org/presentationml/2006/main">
+  <p:cSld>
+    <p:bg>
+      <p:bgPr>
+        <a:solidFill>
+          <a:schemeClr val="bg1"/>
+        </a:solidFill>
+        <a:effectLst/>
+      </p:bgPr>
+    </p:bg>
+    <p:spTree>
+      <p:nvGrpSpPr>
+        <p:cNvPr id="1" name=""/>
+        <p:cNvGrpSpPr/>
+        <p:nvPr/>
+      </p:nvGrpSpPr>
+      <p:grpSpPr>
+        <a:xfrm>
+          <a:off x="0" y="0"/>
+          <a:ext cx="0" cy="0"/>
+          <a:chOff x="0" y="0"/>
+          <a:chExt cx="0" cy="0"/>
+        </a:xfrm>
+      </p:grpSpPr>
+      <p:sp>
+        <p:nvSpPr>
+          <p:cNvPr id="11" name="Rectangle: Top Corners Rounded 10">
+            <a:extLst>
+              <a:ext uri="{FF2B5EF4-FFF2-40B4-BE49-F238E27FC236}">
+                <a16:creationId xmlns:a16="http://schemas.microsoft.com/office/drawing/2014/main" id="{3BAF1561-20C4-41FD-A35F-BF2B9E727F3E}"/>
+              </a:ext>
+            </a:extLst>
+          </p:cNvPr>
+          <p:cNvSpPr>
+            <a:spLocks noGrp="1" noRot="1" noChangeAspect="1" noMove="1" noResize="1" noEditPoints="1" noAdjustHandles="1" noChangeArrowheads="1" noChangeShapeType="1" noTextEdit="1"/>
+          </p:cNvSpPr>
+          <p:nvPr>
+            <p:extLst>
+              <p:ext uri="{386F3935-93C4-4BCD-93E2-E3B085C9AB24}">
+                <p16:designElem xmlns:p16="http://schemas.microsoft.com/office/powerpoint/2015/main" val="1"/>
+              </p:ext>
+            </p:extLst>
+          </p:nvPr>
+        </p:nvSpPr>
+        <p:spPr>
+          <a:xfrm rot="5400000" flipH="1">
+            <a:off x="-529466" y="996722"/>
+            <a:ext cx="5923488" cy="4864556"/>
+          </a:xfrm>
+          <a:prstGeom prst="round2SameRect">
+            <a:avLst>
+              <a:gd name="adj1" fmla="val 3762"/>
+              <a:gd name="adj2" fmla="val 0"/>
+            </a:avLst>
+          </a:prstGeom>
+          <a:solidFill>
+            <a:schemeClr val="tx1">
+              <a:lumMod val="75000"/>
+              <a:lumOff val="25000"/>
+            </a:schemeClr>
+          </a:solidFill>
+          <a:ln>
+            <a:noFill/>
+          </a:ln>
+        </p:spPr>
+        <p:style>
+          <a:lnRef idx="2">
+            <a:schemeClr val="accent1">
+              <a:shade val="50000"/>
+            </a:schemeClr>
+          </a:lnRef>
+          <a:fillRef idx="1">
+            <a:schemeClr val="accent1"/>
+          </a:fillRef>
+          <a:effectRef idx="0">
+            <a:schemeClr val="accent1"/>
+          </a:effectRef>
+          <a:fontRef idx="minor">
+            <a:schemeClr val="lt1"/>
+          </a:fontRef>
+        </p:style>
+        <p:txBody>
+          <a:bodyPr rtlCol="0" anchor="ctr"/>
+          <a:lstStyle/>
+          <a:p>
+            <a:pPr marL="0" marR="0" lvl="0" indent="0" algn="ctr" defTabSz="914400" rtl="0" eaLnBrk="1" fontAlgn="auto" latinLnBrk="0" hangingPunct="1">
+              <a:lnSpc>
+                <a:spcPct val="100000"/>
+              </a:lnSpc>
+              <a:spcBef>
+                <a:spcPts val="0"/>
+              </a:spcBef>
+              <a:spcAft>
+                <a:spcPts val="0"/>
+              </a:spcAft>
+              <a:buClrTx/>
+              <a:buSzTx/>
+              <a:buFontTx/>
+              <a:buNone/>
+              <a:tabLst/>
+              <a:defRPr/>
+            </a:pPr>
+            <a:endParaRPr kumimoji="0" lang="en-US" sz="1800" b="0" i="0" u="none" strike="noStrike" kern="1200" cap="none" spc="0" normalizeH="0" baseline="0" noProof="0">
+              <a:ln>
+                <a:noFill/>
+              </a:ln>
+              <a:solidFill>
+                <a:prstClr val="white"/>
+              </a:solidFill>
+              <a:effectLst/>
+              <a:uLnTx/>
+              <a:uFillTx/>
+              <a:latin typeface="Calibri" panose="020F0502020204030204"/>
+              <a:ea typeface="+mn-ea"/>
+              <a:cs typeface="+mn-cs"/>
+            </a:endParaRPr>
+          </a:p>
+        </p:txBody>
+      </p:sp>
+      <p:sp>
+        <p:nvSpPr>
+          <p:cNvPr id="13" name="Rectangle: Top Corners Rounded 12">
+            <a:extLst>
+              <a:ext uri="{FF2B5EF4-FFF2-40B4-BE49-F238E27FC236}">
+                <a16:creationId xmlns:a16="http://schemas.microsoft.com/office/drawing/2014/main" id="{839DC788-B140-4F3E-A91E-CB3E70ED940A}"/>
+              </a:ext>
+            </a:extLst>
+          </p:cNvPr>
+          <p:cNvSpPr>
+            <a:spLocks noGrp="1" noRot="1" noChangeAspect="1" noMove="1" noResize="1" noEditPoints="1" noAdjustHandles="1" noChangeArrowheads="1" noChangeShapeType="1" noTextEdit="1"/>
+          </p:cNvSpPr>
+          <p:nvPr>
+            <p:extLst>
+              <p:ext uri="{386F3935-93C4-4BCD-93E2-E3B085C9AB24}">
+                <p16:designElem xmlns:p16="http://schemas.microsoft.com/office/powerpoint/2015/main" val="1"/>
+              </p:ext>
+            </p:extLst>
+          </p:nvPr>
+        </p:nvSpPr>
+        <p:spPr>
+          <a:xfrm rot="5400000" flipH="1">
+            <a:off x="-457200" y="1050468"/>
+            <a:ext cx="5609397" cy="4757058"/>
+          </a:xfrm>
+          <a:prstGeom prst="round2SameRect">
+            <a:avLst>
+              <a:gd name="adj1" fmla="val 2061"/>
+              <a:gd name="adj2" fmla="val 0"/>
+            </a:avLst>
+          </a:prstGeom>
+          <a:noFill/>
+          <a:ln w="50800">
+            <a:solidFill>
+              <a:schemeClr val="bg1"/>
+            </a:solidFill>
+          </a:ln>
+        </p:spPr>
+        <p:style>
+          <a:lnRef idx="2">
+            <a:schemeClr val="accent1">
+              <a:shade val="50000"/>
+            </a:schemeClr>
+          </a:lnRef>
+          <a:fillRef idx="1">
+            <a:schemeClr val="accent1"/>
+          </a:fillRef>
+          <a:effectRef idx="0">
+            <a:schemeClr val="accent1"/>
+          </a:effectRef>
+          <a:fontRef idx="minor">
+            <a:schemeClr val="lt1"/>
+          </a:fontRef>
+        </p:style>
+        <p:txBody>
+          <a:bodyPr rtlCol="0" anchor="ctr"/>
+          <a:lstStyle/>
+          <a:p>
+            <a:pPr marL="0" marR="0" lvl="0" indent="0" algn="ctr" defTabSz="914400" rtl="0" eaLnBrk="1" fontAlgn="auto" latinLnBrk="0" hangingPunct="1">
+              <a:lnSpc>
+                <a:spcPct val="100000"/>
+              </a:lnSpc>
+              <a:spcBef>
+                <a:spcPts val="0"/>
+              </a:spcBef>
+              <a:spcAft>
+                <a:spcPts val="0"/>
+              </a:spcAft>
+              <a:buClrTx/>
+              <a:buSzTx/>
+              <a:buFontTx/>
+              <a:buNone/>
+              <a:tabLst/>
+              <a:defRPr/>
+            </a:pPr>
+            <a:endParaRPr kumimoji="0" lang="en-US" sz="1800" b="0" i="0" u="none" strike="noStrike" kern="1200" cap="none" spc="0" normalizeH="0" baseline="0" noProof="0">
+              <a:ln>
+                <a:noFill/>
+              </a:ln>
+              <a:solidFill>
+                <a:prstClr val="white"/>
+              </a:solidFill>
+              <a:effectLst/>
+              <a:uLnTx/>
+              <a:uFillTx/>
+              <a:latin typeface="Calibri" panose="020F0502020204030204"/>
+              <a:ea typeface="+mn-ea"/>
+              <a:cs typeface="+mn-cs"/>
+            </a:endParaRPr>
+          </a:p>
+        </p:txBody>
+      </p:sp>
+      <p:cxnSp>
+        <p:nvCxnSpPr>
+          <p:cNvPr id="15" name="Straight Connector 14">
+            <a:extLst>
+              <a:ext uri="{FF2B5EF4-FFF2-40B4-BE49-F238E27FC236}">
+                <a16:creationId xmlns:a16="http://schemas.microsoft.com/office/drawing/2014/main" id="{FC18D930-0EEE-448F-ABF1-2AA3C83DA552}"/>
+              </a:ext>
+            </a:extLst>
+          </p:cNvPr>
+          <p:cNvCxnSpPr>
+            <a:cxnSpLocks noGrp="1" noRot="1" noChangeAspect="1" noMove="1" noResize="1" noEditPoints="1" noAdjustHandles="1" noChangeArrowheads="1" noChangeShapeType="1"/>
+          </p:cNvCxnSpPr>
+          <p:nvPr>
+            <p:extLst>
+              <p:ext uri="{386F3935-93C4-4BCD-93E2-E3B085C9AB24}">
+                <p16:designElem xmlns:p16="http://schemas.microsoft.com/office/powerpoint/2015/main" val="1"/>
+              </p:ext>
+            </p:extLst>
+          </p:nvPr>
+        </p:nvCxnSpPr>
+        <p:spPr>
+          <a:xfrm>
+            <a:off x="524071" y="2705800"/>
+            <a:ext cx="1597456" cy="0"/>
+          </a:xfrm>
+          <a:prstGeom prst="line">
+            <a:avLst/>
+          </a:prstGeom>
+          <a:ln w="50800">
+            <a:solidFill>
+              <a:schemeClr val="bg1">
+                <a:lumMod val="65000"/>
+              </a:schemeClr>
+            </a:solidFill>
+          </a:ln>
+        </p:spPr>
+        <p:style>
+          <a:lnRef idx="1">
+            <a:schemeClr val="accent1"/>
+          </a:lnRef>
+          <a:fillRef idx="0">
+            <a:schemeClr val="accent1"/>
+          </a:fillRef>
+          <a:effectRef idx="0">
+            <a:schemeClr val="accent1"/>
+          </a:effectRef>
+          <a:fontRef idx="minor">
+            <a:schemeClr val="tx1"/>
+          </a:fontRef>
+        </p:style>
+      </p:cxnSp>
+      <p:pic>
+        <p:nvPicPr>
+          <p:cNvPr id="6" name="Picture 5">
+            <a:extLst>
+              <a:ext uri="{FF2B5EF4-FFF2-40B4-BE49-F238E27FC236}">
+                <a16:creationId xmlns:a16="http://schemas.microsoft.com/office/drawing/2014/main" id="{5F5379C1-B026-4F23-B0FB-651642E1D0CF}"/>
+              </a:ext>
+            </a:extLst>
+          </p:cNvPr>
+          <p:cNvPicPr>
+            <a:picLocks noChangeAspect="1"/>
+          </p:cNvPicPr>
+          <p:nvPr/>
+        </p:nvPicPr>
+        <p:blipFill>
+          <a:blip r:embed="rId2"/>
+          <a:stretch>
+            <a:fillRect/>
+          </a:stretch>
+        </p:blipFill>
+        <p:spPr>
+          <a:xfrm>
+            <a:off x="5203767" y="905359"/>
+            <a:ext cx="6542117" cy="4890233"/>
+          </a:xfrm>
+          <a:prstGeom prst="rect">
+            <a:avLst/>
+          </a:prstGeom>
+        </p:spPr>
+      </p:pic>
+      <p:sp>
+        <p:nvSpPr>
+          <p:cNvPr id="2" name="Title 1">
+            <a:extLst>
+              <a:ext uri="{FF2B5EF4-FFF2-40B4-BE49-F238E27FC236}">
+                <a16:creationId xmlns:a16="http://schemas.microsoft.com/office/drawing/2014/main" id="{C94A9C2F-625C-4582-B125-60F818667043}"/>
+              </a:ext>
+            </a:extLst>
+          </p:cNvPr>
+          <p:cNvSpPr>
+            <a:spLocks noGrp="1"/>
+          </p:cNvSpPr>
+          <p:nvPr>
+            <p:ph type="title"/>
+          </p:nvPr>
+        </p:nvSpPr>
+        <p:spPr>
+          <a:xfrm>
+            <a:off x="321733" y="981091"/>
+            <a:ext cx="4092951" cy="1624457"/>
+          </a:xfrm>
+        </p:spPr>
+        <p:txBody>
+          <a:bodyPr vert="horz" lIns="91440" tIns="45720" rIns="91440" bIns="45720" rtlCol="0" anchor="ctr">
+            <a:normAutofit/>
+          </a:bodyPr>
+          <a:lstStyle/>
+          <a:p>
+            <a:r>
+              <a:rPr lang="en-US" sz="3600" kern="1200">
+                <a:solidFill>
+                  <a:schemeClr val="bg1"/>
+                </a:solidFill>
+                <a:latin typeface="+mj-lt"/>
+                <a:ea typeface="+mj-ea"/>
+                <a:cs typeface="+mj-cs"/>
+              </a:rPr>
+              <a:t>Adaptive Powered Descent Initiation</a:t>
+            </a:r>
+          </a:p>
+        </p:txBody>
+      </p:sp>
+      <p:sp>
+        <p:nvSpPr>
+          <p:cNvPr id="4" name="Text Placeholder 3">
+            <a:extLst>
+              <a:ext uri="{FF2B5EF4-FFF2-40B4-BE49-F238E27FC236}">
+                <a16:creationId xmlns:a16="http://schemas.microsoft.com/office/drawing/2014/main" id="{034A8DA8-69FD-46F9-9264-EF900CD6FDBC}"/>
+              </a:ext>
+            </a:extLst>
+          </p:cNvPr>
+          <p:cNvSpPr>
+            <a:spLocks noGrp="1"/>
+          </p:cNvSpPr>
+          <p:nvPr>
+            <p:ph type="body" sz="half" idx="2"/>
+          </p:nvPr>
+        </p:nvSpPr>
+        <p:spPr>
+          <a:xfrm>
+            <a:off x="321733" y="2834809"/>
+            <a:ext cx="4092951" cy="3042099"/>
+          </a:xfrm>
+        </p:spPr>
+        <p:txBody>
+          <a:bodyPr vert="horz" lIns="91440" tIns="45720" rIns="91440" bIns="45720" rtlCol="0" anchor="t">
+            <a:normAutofit/>
+          </a:bodyPr>
+          <a:lstStyle/>
+          <a:p>
+            <a:pPr marL="285750" indent="-228600">
+              <a:buFont typeface="Arial" panose="020B0604020202020204" pitchFamily="34" charset="0"/>
+              <a:buChar char="•"/>
+            </a:pPr>
+            <a:r>
+              <a:rPr lang="en-US" sz="1400" dirty="0">
+                <a:solidFill>
+                  <a:schemeClr val="bg1"/>
+                </a:solidFill>
+              </a:rPr>
+              <a:t>Few powered descent guidance formulations consider optimized engine ignition time, though most acknowledge the need for ignition criteria. These are typically predetermined altitudes, </a:t>
+            </a:r>
+            <a:r>
+              <a:rPr lang="en-US" sz="1400" dirty="0" err="1">
+                <a:solidFill>
+                  <a:schemeClr val="bg1"/>
+                </a:solidFill>
+              </a:rPr>
+              <a:t>groundranges</a:t>
+            </a:r>
+            <a:r>
+              <a:rPr lang="en-US" sz="1400" dirty="0">
+                <a:solidFill>
+                  <a:schemeClr val="bg1"/>
+                </a:solidFill>
+              </a:rPr>
+              <a:t>, </a:t>
+            </a:r>
+            <a:r>
+              <a:rPr lang="en-US" sz="1400" dirty="0" err="1">
+                <a:solidFill>
+                  <a:schemeClr val="bg1"/>
+                </a:solidFill>
+              </a:rPr>
+              <a:t>etc</a:t>
+            </a:r>
+            <a:endParaRPr lang="en-US" sz="1400" dirty="0">
+              <a:solidFill>
+                <a:schemeClr val="bg1"/>
+              </a:solidFill>
+            </a:endParaRPr>
+          </a:p>
+          <a:p>
+            <a:pPr marL="285750" indent="-228600">
+              <a:buFont typeface="Arial" panose="020B0604020202020204" pitchFamily="34" charset="0"/>
+              <a:buChar char="•"/>
+            </a:pPr>
+            <a:r>
+              <a:rPr lang="en-US" sz="1400" dirty="0">
+                <a:solidFill>
+                  <a:schemeClr val="bg1"/>
+                </a:solidFill>
+              </a:rPr>
+              <a:t>Adaptive PDI uses the gravity turn solution as a threshold value. When required thrust exceeds maximum available thrust, or when </a:t>
+            </a:r>
+            <a:r>
+              <a:rPr lang="en-US" sz="1400" dirty="0" err="1">
+                <a:solidFill>
+                  <a:schemeClr val="bg1"/>
+                </a:solidFill>
+              </a:rPr>
+              <a:t>groundrange</a:t>
+            </a:r>
+            <a:r>
+              <a:rPr lang="en-US" sz="1400" dirty="0">
+                <a:solidFill>
+                  <a:schemeClr val="bg1"/>
+                </a:solidFill>
+              </a:rPr>
+              <a:t> traveled by a gravity turn exceeds ground distance to the landing site, the engine is ignited.</a:t>
+            </a:r>
+          </a:p>
+          <a:p>
+            <a:pPr marL="285750" indent="-228600">
+              <a:buFont typeface="Arial" panose="020B0604020202020204" pitchFamily="34" charset="0"/>
+              <a:buChar char="•"/>
+            </a:pPr>
+            <a:r>
+              <a:rPr lang="en-US" sz="1400" dirty="0">
+                <a:solidFill>
+                  <a:schemeClr val="bg1"/>
+                </a:solidFill>
+              </a:rPr>
+              <a:t>These criteria are shown to be robust</a:t>
+            </a:r>
+          </a:p>
+        </p:txBody>
+      </p:sp>
+      <p:sp>
+        <p:nvSpPr>
+          <p:cNvPr id="5" name="Slide Number Placeholder 4">
+            <a:extLst>
+              <a:ext uri="{FF2B5EF4-FFF2-40B4-BE49-F238E27FC236}">
+                <a16:creationId xmlns:a16="http://schemas.microsoft.com/office/drawing/2014/main" id="{4BE853DC-B249-4F99-8793-B6330AE4B3FE}"/>
+              </a:ext>
+            </a:extLst>
+          </p:cNvPr>
+          <p:cNvSpPr>
+            <a:spLocks noGrp="1"/>
+          </p:cNvSpPr>
+          <p:nvPr>
+            <p:ph type="sldNum" sz="quarter" idx="12"/>
+          </p:nvPr>
+        </p:nvSpPr>
+        <p:spPr>
+          <a:xfrm>
+            <a:off x="8610600" y="6356350"/>
+            <a:ext cx="2743200" cy="365125"/>
+          </a:xfrm>
+        </p:spPr>
+        <p:txBody>
+          <a:bodyPr vert="horz" lIns="91440" tIns="45720" rIns="91440" bIns="45720" rtlCol="0" anchor="ctr">
+            <a:normAutofit/>
+          </a:bodyPr>
+          <a:lstStyle/>
+          <a:p>
+            <a:pPr>
+              <a:spcAft>
+                <a:spcPts val="600"/>
+              </a:spcAft>
+            </a:pPr>
+            <a:fld id="{883A1948-8D50-4BC1-A052-3D414D62852E}" type="slidenum">
+              <a:rPr lang="en-US">
+                <a:solidFill>
+                  <a:prstClr val="black">
+                    <a:tint val="75000"/>
+                  </a:prstClr>
+                </a:solidFill>
+              </a:rPr>
+              <a:pPr>
+                <a:spcAft>
+                  <a:spcPts val="600"/>
+                </a:spcAft>
+              </a:pPr>
+              <a:t>14</a:t>
+            </a:fld>
+            <a:endParaRPr lang="en-US">
+              <a:solidFill>
+                <a:prstClr val="black">
+                  <a:tint val="75000"/>
+                </a:prstClr>
+              </a:solidFill>
+            </a:endParaRPr>
+          </a:p>
+        </p:txBody>
+      </p:sp>
+    </p:spTree>
+    <p:extLst>
+      <p:ext uri="{BB962C8B-B14F-4D97-AF65-F5344CB8AC3E}">
+        <p14:creationId xmlns:p14="http://schemas.microsoft.com/office/powerpoint/2010/main" val="310432984"/>
+      </p:ext>
+    </p:extLst>
+  </p:cSld>
+  <p:clrMapOvr>
+    <a:masterClrMapping/>
+  </p:clrMapOvr>
+</p:sld>
+</file>
+
+<file path=ppt/slides/slide15.xml><?xml version="1.0" encoding="utf-8"?>
+<p:sld xmlns:a="http://schemas.openxmlformats.org/drawingml/2006/main" xmlns:r="http://schemas.openxmlformats.org/officeDocument/2006/relationships" xmlns:p="http://schemas.openxmlformats.org/presentationml/2006/main">
+  <p:cSld>
+    <p:spTree>
+      <p:nvGrpSpPr>
+        <p:cNvPr id="1" name=""/>
+        <p:cNvGrpSpPr/>
+        <p:nvPr/>
+      </p:nvGrpSpPr>
+      <p:grpSpPr>
+        <a:xfrm>
+          <a:off x="0" y="0"/>
+          <a:ext cx="0" cy="0"/>
+          <a:chOff x="0" y="0"/>
+          <a:chExt cx="0" cy="0"/>
+        </a:xfrm>
+      </p:grpSpPr>
+      <p:sp>
+        <p:nvSpPr>
+          <p:cNvPr id="6" name="Title 5">
+            <a:extLst>
+              <a:ext uri="{FF2B5EF4-FFF2-40B4-BE49-F238E27FC236}">
+                <a16:creationId xmlns:a16="http://schemas.microsoft.com/office/drawing/2014/main" id="{2F67C404-376D-4BDF-90F8-963FB39FFD8D}"/>
+              </a:ext>
+            </a:extLst>
+          </p:cNvPr>
+          <p:cNvSpPr>
+            <a:spLocks noGrp="1"/>
+          </p:cNvSpPr>
+          <p:nvPr>
+            <p:ph type="ctrTitle"/>
+          </p:nvPr>
+        </p:nvSpPr>
+        <p:spPr/>
+        <p:txBody>
+          <a:bodyPr/>
+          <a:lstStyle/>
+          <a:p>
+            <a:r>
+              <a:rPr lang="en-US" dirty="0"/>
+              <a:t>Simulation</a:t>
+            </a:r>
+          </a:p>
+        </p:txBody>
+      </p:sp>
+      <p:sp>
+        <p:nvSpPr>
+          <p:cNvPr id="7" name="Subtitle 6">
+            <a:extLst>
+              <a:ext uri="{FF2B5EF4-FFF2-40B4-BE49-F238E27FC236}">
+                <a16:creationId xmlns:a16="http://schemas.microsoft.com/office/drawing/2014/main" id="{A1261E38-3400-4027-A32D-C5818E0C61C5}"/>
+              </a:ext>
+            </a:extLst>
+          </p:cNvPr>
+          <p:cNvSpPr>
+            <a:spLocks noGrp="1"/>
+          </p:cNvSpPr>
+          <p:nvPr>
+            <p:ph type="subTitle" idx="1"/>
+          </p:nvPr>
+        </p:nvSpPr>
+        <p:spPr/>
+        <p:txBody>
+          <a:bodyPr/>
+          <a:lstStyle/>
+          <a:p>
+            <a:r>
+              <a:rPr lang="en-US" dirty="0"/>
+              <a:t>Architecture and Implementation</a:t>
+            </a:r>
+          </a:p>
+        </p:txBody>
+      </p:sp>
+      <p:sp>
+        <p:nvSpPr>
+          <p:cNvPr id="5" name="Slide Number Placeholder 4">
+            <a:extLst>
+              <a:ext uri="{FF2B5EF4-FFF2-40B4-BE49-F238E27FC236}">
+                <a16:creationId xmlns:a16="http://schemas.microsoft.com/office/drawing/2014/main" id="{10092319-612C-457A-947E-F03EE80E8CBA}"/>
+              </a:ext>
+            </a:extLst>
+          </p:cNvPr>
+          <p:cNvSpPr>
+            <a:spLocks noGrp="1"/>
+          </p:cNvSpPr>
+          <p:nvPr>
+            <p:ph type="sldNum" sz="quarter" idx="12"/>
+          </p:nvPr>
+        </p:nvSpPr>
+        <p:spPr/>
+        <p:txBody>
+          <a:bodyPr/>
+          <a:lstStyle/>
+          <a:p>
+            <a:fld id="{883A1948-8D50-4BC1-A052-3D414D62852E}" type="slidenum">
+              <a:rPr lang="en-US" smtClean="0"/>
+              <a:t>15</a:t>
+            </a:fld>
+            <a:endParaRPr lang="en-US"/>
+          </a:p>
+        </p:txBody>
+      </p:sp>
+    </p:spTree>
+    <p:extLst>
+      <p:ext uri="{BB962C8B-B14F-4D97-AF65-F5344CB8AC3E}">
+        <p14:creationId xmlns:p14="http://schemas.microsoft.com/office/powerpoint/2010/main" val="328535327"/>
+      </p:ext>
+    </p:extLst>
+  </p:cSld>
+  <p:clrMapOvr>
+    <a:masterClrMapping/>
+  </p:clrMapOvr>
+</p:sld>
+</file>
+
+<file path=ppt/slides/slide16.xml><?xml version="1.0" encoding="utf-8"?>
+<p:sld xmlns:a="http://schemas.openxmlformats.org/drawingml/2006/main" xmlns:r="http://schemas.openxmlformats.org/officeDocument/2006/relationships" xmlns:p="http://schemas.openxmlformats.org/presentationml/2006/main">
+  <p:cSld>
+    <p:spTree>
+      <p:nvGrpSpPr>
+        <p:cNvPr id="1" name=""/>
+        <p:cNvGrpSpPr/>
+        <p:nvPr/>
+      </p:nvGrpSpPr>
+      <p:grpSpPr>
+        <a:xfrm>
+          <a:off x="0" y="0"/>
+          <a:ext cx="0" cy="0"/>
+          <a:chOff x="0" y="0"/>
+          <a:chExt cx="0" cy="0"/>
+        </a:xfrm>
+      </p:grpSpPr>
+      <p:sp>
+        <p:nvSpPr>
+          <p:cNvPr id="2" name="Title 1">
+            <a:extLst>
+              <a:ext uri="{FF2B5EF4-FFF2-40B4-BE49-F238E27FC236}">
+                <a16:creationId xmlns:a16="http://schemas.microsoft.com/office/drawing/2014/main" id="{4D8D8A09-95E1-41DD-AD47-2B99A492EA92}"/>
+              </a:ext>
+            </a:extLst>
+          </p:cNvPr>
+          <p:cNvSpPr>
+            <a:spLocks noGrp="1"/>
+          </p:cNvSpPr>
+          <p:nvPr>
+            <p:ph type="title"/>
+          </p:nvPr>
+        </p:nvSpPr>
+        <p:spPr>
+          <a:xfrm>
+            <a:off x="536441" y="181597"/>
+            <a:ext cx="2011525" cy="1325563"/>
+          </a:xfrm>
+          <a:ln>
+            <a:solidFill>
+              <a:schemeClr val="tx1"/>
+            </a:solidFill>
+          </a:ln>
+        </p:spPr>
+        <p:txBody>
+          <a:bodyPr>
+            <a:normAutofit/>
+          </a:bodyPr>
+          <a:lstStyle/>
+          <a:p>
+            <a:r>
+              <a:rPr lang="en-US" sz="2800" dirty="0"/>
+              <a:t>Simulation Architecture</a:t>
+            </a:r>
+          </a:p>
+        </p:txBody>
+      </p:sp>
+      <p:sp>
+        <p:nvSpPr>
+          <p:cNvPr id="4" name="Slide Number Placeholder 3">
+            <a:extLst>
+              <a:ext uri="{FF2B5EF4-FFF2-40B4-BE49-F238E27FC236}">
+                <a16:creationId xmlns:a16="http://schemas.microsoft.com/office/drawing/2014/main" id="{B42C04CE-D278-4BEA-AF0C-931878D89F6D}"/>
+              </a:ext>
+            </a:extLst>
+          </p:cNvPr>
+          <p:cNvSpPr>
+            <a:spLocks noGrp="1"/>
+          </p:cNvSpPr>
+          <p:nvPr>
+            <p:ph type="sldNum" sz="quarter" idx="12"/>
+          </p:nvPr>
+        </p:nvSpPr>
+        <p:spPr/>
+        <p:txBody>
+          <a:bodyPr/>
+          <a:lstStyle/>
+          <a:p>
+            <a:fld id="{883A1948-8D50-4BC1-A052-3D414D62852E}" type="slidenum">
+              <a:rPr lang="en-US" smtClean="0"/>
+              <a:t>16</a:t>
+            </a:fld>
+            <a:endParaRPr lang="en-US"/>
+          </a:p>
+        </p:txBody>
+      </p:sp>
+      <p:sp>
+        <p:nvSpPr>
+          <p:cNvPr id="5" name="Flowchart: Process 4">
+            <a:extLst>
+              <a:ext uri="{FF2B5EF4-FFF2-40B4-BE49-F238E27FC236}">
+                <a16:creationId xmlns:a16="http://schemas.microsoft.com/office/drawing/2014/main" id="{1A01B637-42DE-4D68-987B-9874823DB5A9}"/>
+              </a:ext>
+            </a:extLst>
+          </p:cNvPr>
+          <p:cNvSpPr/>
+          <p:nvPr/>
+        </p:nvSpPr>
+        <p:spPr>
+          <a:xfrm>
+            <a:off x="5009666" y="710984"/>
+            <a:ext cx="2139519" cy="612648"/>
+          </a:xfrm>
+          <a:prstGeom prst="flowChartProcess">
+            <a:avLst/>
+          </a:prstGeom>
+        </p:spPr>
+        <p:style>
+          <a:lnRef idx="2">
+            <a:schemeClr val="accent1">
+              <a:shade val="50000"/>
+            </a:schemeClr>
+          </a:lnRef>
+          <a:fillRef idx="1">
+            <a:schemeClr val="accent1"/>
+          </a:fillRef>
+          <a:effectRef idx="0">
+            <a:schemeClr val="accent1"/>
+          </a:effectRef>
+          <a:fontRef idx="minor">
+            <a:schemeClr val="lt1"/>
+          </a:fontRef>
+        </p:style>
+        <p:txBody>
+          <a:bodyPr rtlCol="0" anchor="ctr"/>
+          <a:lstStyle/>
+          <a:p>
+            <a:pPr algn="ctr"/>
+            <a:r>
+              <a:rPr lang="en-US" dirty="0"/>
+              <a:t>Monte-Carlo: Disperse Conditions</a:t>
+            </a:r>
+          </a:p>
+        </p:txBody>
+      </p:sp>
+      <p:sp>
+        <p:nvSpPr>
+          <p:cNvPr id="6" name="Flowchart: Data 5">
+            <a:extLst>
+              <a:ext uri="{FF2B5EF4-FFF2-40B4-BE49-F238E27FC236}">
+                <a16:creationId xmlns:a16="http://schemas.microsoft.com/office/drawing/2014/main" id="{F806380B-3A80-4908-940D-08C7E23BF591}"/>
+              </a:ext>
+            </a:extLst>
+          </p:cNvPr>
+          <p:cNvSpPr/>
+          <p:nvPr/>
+        </p:nvSpPr>
+        <p:spPr>
+          <a:xfrm>
+            <a:off x="7253291" y="5875783"/>
+            <a:ext cx="1065446" cy="383046"/>
+          </a:xfrm>
+          <a:prstGeom prst="flowChartInputOutput">
+            <a:avLst/>
+          </a:prstGeom>
+        </p:spPr>
+        <p:style>
+          <a:lnRef idx="2">
+            <a:schemeClr val="accent1">
+              <a:shade val="50000"/>
+            </a:schemeClr>
+          </a:lnRef>
+          <a:fillRef idx="1">
+            <a:schemeClr val="accent1"/>
+          </a:fillRef>
+          <a:effectRef idx="0">
+            <a:schemeClr val="accent1"/>
+          </a:effectRef>
+          <a:fontRef idx="minor">
+            <a:schemeClr val="lt1"/>
+          </a:fontRef>
+        </p:style>
+        <p:txBody>
+          <a:bodyPr rtlCol="0" anchor="ctr"/>
+          <a:lstStyle/>
+          <a:p>
+            <a:pPr algn="ctr"/>
+            <a:r>
+              <a:rPr lang="en-US" sz="1000" dirty="0"/>
+              <a:t>Record run data</a:t>
+            </a:r>
+          </a:p>
+        </p:txBody>
+      </p:sp>
+      <p:sp>
+        <p:nvSpPr>
+          <p:cNvPr id="7" name="Flowchart: Process 6">
+            <a:extLst>
+              <a:ext uri="{FF2B5EF4-FFF2-40B4-BE49-F238E27FC236}">
+                <a16:creationId xmlns:a16="http://schemas.microsoft.com/office/drawing/2014/main" id="{817EE09E-897B-4630-9D7D-343E1C3E648D}"/>
+              </a:ext>
+            </a:extLst>
+          </p:cNvPr>
+          <p:cNvSpPr/>
+          <p:nvPr/>
+        </p:nvSpPr>
+        <p:spPr>
+          <a:xfrm>
+            <a:off x="3160450" y="1690689"/>
+            <a:ext cx="5823751" cy="3662546"/>
+          </a:xfrm>
+          <a:prstGeom prst="flowChartProcess">
+            <a:avLst/>
+          </a:prstGeom>
+          <a:noFill/>
+        </p:spPr>
+        <p:style>
+          <a:lnRef idx="2">
+            <a:schemeClr val="accent1">
+              <a:shade val="50000"/>
+            </a:schemeClr>
+          </a:lnRef>
+          <a:fillRef idx="1">
+            <a:schemeClr val="accent1"/>
+          </a:fillRef>
+          <a:effectRef idx="0">
+            <a:schemeClr val="accent1"/>
+          </a:effectRef>
+          <a:fontRef idx="minor">
+            <a:schemeClr val="lt1"/>
+          </a:fontRef>
+        </p:style>
+        <p:txBody>
+          <a:bodyPr rtlCol="0" anchor="ctr"/>
+          <a:lstStyle/>
+          <a:p>
+            <a:pPr algn="ctr"/>
+            <a:endParaRPr lang="en-US" dirty="0">
+              <a:solidFill>
+                <a:schemeClr val="accent1">
+                  <a:lumMod val="75000"/>
+                </a:schemeClr>
+              </a:solidFill>
+            </a:endParaRPr>
+          </a:p>
+        </p:txBody>
+      </p:sp>
+      <p:sp>
+        <p:nvSpPr>
+          <p:cNvPr id="8" name="TextBox 7">
+            <a:extLst>
+              <a:ext uri="{FF2B5EF4-FFF2-40B4-BE49-F238E27FC236}">
+                <a16:creationId xmlns:a16="http://schemas.microsoft.com/office/drawing/2014/main" id="{D4E22703-832B-4013-B3B9-927D91AFC1F4}"/>
+              </a:ext>
+            </a:extLst>
+          </p:cNvPr>
+          <p:cNvSpPr txBox="1"/>
+          <p:nvPr/>
+        </p:nvSpPr>
+        <p:spPr>
+          <a:xfrm>
+            <a:off x="3307673" y="2449709"/>
+            <a:ext cx="1380078" cy="369332"/>
+          </a:xfrm>
+          <a:prstGeom prst="rect">
+            <a:avLst/>
+          </a:prstGeom>
+          <a:noFill/>
+        </p:spPr>
+        <p:txBody>
+          <a:bodyPr wrap="square" rtlCol="0">
+            <a:spAutoFit/>
+          </a:bodyPr>
+          <a:lstStyle/>
+          <a:p>
+            <a:r>
+              <a:rPr lang="en-US" dirty="0"/>
+              <a:t>Simulation</a:t>
+            </a:r>
+          </a:p>
+        </p:txBody>
+      </p:sp>
+      <p:sp>
+        <p:nvSpPr>
+          <p:cNvPr id="9" name="Flowchart: Process 8">
+            <a:extLst>
+              <a:ext uri="{FF2B5EF4-FFF2-40B4-BE49-F238E27FC236}">
+                <a16:creationId xmlns:a16="http://schemas.microsoft.com/office/drawing/2014/main" id="{B03F31C6-CE80-434F-9835-68A06C4D1965}"/>
+              </a:ext>
+            </a:extLst>
+          </p:cNvPr>
+          <p:cNvSpPr/>
+          <p:nvPr/>
+        </p:nvSpPr>
+        <p:spPr>
+          <a:xfrm>
+            <a:off x="5490464" y="2689144"/>
+            <a:ext cx="1163721" cy="372153"/>
+          </a:xfrm>
+          <a:prstGeom prst="flowChartProcess">
+            <a:avLst/>
+          </a:prstGeom>
+        </p:spPr>
+        <p:style>
+          <a:lnRef idx="2">
+            <a:schemeClr val="accent1">
+              <a:shade val="50000"/>
+            </a:schemeClr>
+          </a:lnRef>
+          <a:fillRef idx="1">
+            <a:schemeClr val="accent1"/>
+          </a:fillRef>
+          <a:effectRef idx="0">
+            <a:schemeClr val="accent1"/>
+          </a:effectRef>
+          <a:fontRef idx="minor">
+            <a:schemeClr val="lt1"/>
+          </a:fontRef>
+        </p:style>
+        <p:txBody>
+          <a:bodyPr rtlCol="0" anchor="ctr"/>
+          <a:lstStyle/>
+          <a:p>
+            <a:pPr algn="ctr"/>
+            <a:r>
+              <a:rPr lang="en-US" sz="1000" dirty="0"/>
+              <a:t>Guidance Computer</a:t>
+            </a:r>
+          </a:p>
+        </p:txBody>
+      </p:sp>
+      <p:sp>
+        <p:nvSpPr>
+          <p:cNvPr id="10" name="Flowchart: Process 9">
+            <a:extLst>
+              <a:ext uri="{FF2B5EF4-FFF2-40B4-BE49-F238E27FC236}">
+                <a16:creationId xmlns:a16="http://schemas.microsoft.com/office/drawing/2014/main" id="{65042078-B78D-4BA6-AFC5-C9A9C711677C}"/>
+              </a:ext>
+            </a:extLst>
+          </p:cNvPr>
+          <p:cNvSpPr/>
+          <p:nvPr/>
+        </p:nvSpPr>
+        <p:spPr>
+          <a:xfrm>
+            <a:off x="5490464" y="2087162"/>
+            <a:ext cx="1163721" cy="372153"/>
+          </a:xfrm>
+          <a:prstGeom prst="flowChartProcess">
+            <a:avLst/>
+          </a:prstGeom>
+        </p:spPr>
+        <p:style>
+          <a:lnRef idx="2">
+            <a:schemeClr val="accent1">
+              <a:shade val="50000"/>
+            </a:schemeClr>
+          </a:lnRef>
+          <a:fillRef idx="1">
+            <a:schemeClr val="accent1"/>
+          </a:fillRef>
+          <a:effectRef idx="0">
+            <a:schemeClr val="accent1"/>
+          </a:effectRef>
+          <a:fontRef idx="minor">
+            <a:schemeClr val="lt1"/>
+          </a:fontRef>
+        </p:style>
+        <p:txBody>
+          <a:bodyPr rtlCol="0" anchor="ctr"/>
+          <a:lstStyle/>
+          <a:p>
+            <a:pPr algn="ctr"/>
+            <a:r>
+              <a:rPr lang="en-US" sz="1000" dirty="0"/>
+              <a:t>Navigation Module</a:t>
+            </a:r>
+          </a:p>
+        </p:txBody>
+      </p:sp>
+      <p:sp>
+        <p:nvSpPr>
+          <p:cNvPr id="11" name="Flowchart: Process 10">
+            <a:extLst>
+              <a:ext uri="{FF2B5EF4-FFF2-40B4-BE49-F238E27FC236}">
+                <a16:creationId xmlns:a16="http://schemas.microsoft.com/office/drawing/2014/main" id="{7A8A9146-EA74-4016-868F-14782D4FE5A7}"/>
+              </a:ext>
+            </a:extLst>
+          </p:cNvPr>
+          <p:cNvSpPr/>
+          <p:nvPr/>
+        </p:nvSpPr>
+        <p:spPr>
+          <a:xfrm>
+            <a:off x="5511550" y="3894174"/>
+            <a:ext cx="1121550" cy="372153"/>
+          </a:xfrm>
+          <a:prstGeom prst="flowChartProcess">
+            <a:avLst/>
+          </a:prstGeom>
+        </p:spPr>
+        <p:style>
+          <a:lnRef idx="2">
+            <a:schemeClr val="accent1">
+              <a:shade val="50000"/>
+            </a:schemeClr>
+          </a:lnRef>
+          <a:fillRef idx="1">
+            <a:schemeClr val="accent1"/>
+          </a:fillRef>
+          <a:effectRef idx="0">
+            <a:schemeClr val="accent1"/>
+          </a:effectRef>
+          <a:fontRef idx="minor">
+            <a:schemeClr val="lt1"/>
+          </a:fontRef>
+        </p:style>
+        <p:txBody>
+          <a:bodyPr rtlCol="0" anchor="ctr"/>
+          <a:lstStyle/>
+          <a:p>
+            <a:pPr algn="ctr"/>
+            <a:r>
+              <a:rPr lang="en-US" sz="1000" dirty="0"/>
+              <a:t>Numerical Integration</a:t>
+            </a:r>
+          </a:p>
+        </p:txBody>
+      </p:sp>
+      <p:sp>
+        <p:nvSpPr>
+          <p:cNvPr id="12" name="Flowchart: Decision 11">
+            <a:extLst>
+              <a:ext uri="{FF2B5EF4-FFF2-40B4-BE49-F238E27FC236}">
+                <a16:creationId xmlns:a16="http://schemas.microsoft.com/office/drawing/2014/main" id="{345ACF6B-3566-421F-A62B-47FEB1A55D23}"/>
+              </a:ext>
+            </a:extLst>
+          </p:cNvPr>
+          <p:cNvSpPr/>
+          <p:nvPr/>
+        </p:nvSpPr>
+        <p:spPr>
+          <a:xfrm>
+            <a:off x="5318902" y="4469090"/>
+            <a:ext cx="1514389" cy="468199"/>
+          </a:xfrm>
+          <a:prstGeom prst="flowChartDecision">
+            <a:avLst/>
+          </a:prstGeom>
+        </p:spPr>
+        <p:style>
+          <a:lnRef idx="2">
+            <a:schemeClr val="accent1">
+              <a:shade val="50000"/>
+            </a:schemeClr>
+          </a:lnRef>
+          <a:fillRef idx="1">
+            <a:schemeClr val="accent1"/>
+          </a:fillRef>
+          <a:effectRef idx="0">
+            <a:schemeClr val="accent1"/>
+          </a:effectRef>
+          <a:fontRef idx="minor">
+            <a:schemeClr val="lt1"/>
+          </a:fontRef>
+        </p:style>
+        <p:txBody>
+          <a:bodyPr rtlCol="0" anchor="ctr"/>
+          <a:lstStyle/>
+          <a:p>
+            <a:pPr algn="ctr"/>
+            <a:r>
+              <a:rPr lang="en-US" sz="1000" dirty="0"/>
+              <a:t>Landed?</a:t>
+            </a:r>
+          </a:p>
+        </p:txBody>
+      </p:sp>
+      <p:cxnSp>
+        <p:nvCxnSpPr>
+          <p:cNvPr id="14" name="Straight Arrow Connector 13">
+            <a:extLst>
+              <a:ext uri="{FF2B5EF4-FFF2-40B4-BE49-F238E27FC236}">
+                <a16:creationId xmlns:a16="http://schemas.microsoft.com/office/drawing/2014/main" id="{2C475D1A-87B5-45E3-99AD-6ED8DFF4D90B}"/>
+              </a:ext>
+            </a:extLst>
+          </p:cNvPr>
+          <p:cNvCxnSpPr>
+            <a:cxnSpLocks/>
+            <a:stCxn id="5" idx="2"/>
+            <a:endCxn id="7" idx="0"/>
+          </p:cNvCxnSpPr>
+          <p:nvPr/>
+        </p:nvCxnSpPr>
+        <p:spPr>
+          <a:xfrm flipH="1">
+            <a:off x="6072326" y="1323632"/>
+            <a:ext cx="7100" cy="367057"/>
+          </a:xfrm>
+          <a:prstGeom prst="straightConnector1">
+            <a:avLst/>
+          </a:prstGeom>
+          <a:ln>
+            <a:tailEnd type="triangle"/>
+          </a:ln>
+        </p:spPr>
+        <p:style>
+          <a:lnRef idx="1">
+            <a:schemeClr val="accent1"/>
+          </a:lnRef>
+          <a:fillRef idx="0">
+            <a:schemeClr val="accent1"/>
+          </a:fillRef>
+          <a:effectRef idx="0">
+            <a:schemeClr val="accent1"/>
+          </a:effectRef>
+          <a:fontRef idx="minor">
+            <a:schemeClr val="tx1"/>
+          </a:fontRef>
+        </p:style>
+      </p:cxnSp>
+      <p:cxnSp>
+        <p:nvCxnSpPr>
+          <p:cNvPr id="40" name="Straight Arrow Connector 39">
+            <a:extLst>
+              <a:ext uri="{FF2B5EF4-FFF2-40B4-BE49-F238E27FC236}">
+                <a16:creationId xmlns:a16="http://schemas.microsoft.com/office/drawing/2014/main" id="{9B98956E-DC85-4BDC-A7AF-88EB6535F4EE}"/>
+              </a:ext>
+            </a:extLst>
+          </p:cNvPr>
+          <p:cNvCxnSpPr>
+            <a:stCxn id="10" idx="2"/>
+            <a:endCxn id="9" idx="0"/>
+          </p:cNvCxnSpPr>
+          <p:nvPr/>
+        </p:nvCxnSpPr>
+        <p:spPr>
+          <a:xfrm>
+            <a:off x="6072325" y="2459315"/>
+            <a:ext cx="0" cy="229829"/>
+          </a:xfrm>
+          <a:prstGeom prst="straightConnector1">
+            <a:avLst/>
+          </a:prstGeom>
+          <a:ln>
+            <a:tailEnd type="triangle"/>
+          </a:ln>
+        </p:spPr>
+        <p:style>
+          <a:lnRef idx="1">
+            <a:schemeClr val="accent1"/>
+          </a:lnRef>
+          <a:fillRef idx="0">
+            <a:schemeClr val="accent1"/>
+          </a:fillRef>
+          <a:effectRef idx="0">
+            <a:schemeClr val="accent1"/>
+          </a:effectRef>
+          <a:fontRef idx="minor">
+            <a:schemeClr val="tx1"/>
+          </a:fontRef>
+        </p:style>
+      </p:cxnSp>
+      <p:cxnSp>
+        <p:nvCxnSpPr>
+          <p:cNvPr id="44" name="Straight Arrow Connector 43">
+            <a:extLst>
+              <a:ext uri="{FF2B5EF4-FFF2-40B4-BE49-F238E27FC236}">
+                <a16:creationId xmlns:a16="http://schemas.microsoft.com/office/drawing/2014/main" id="{DC3129FF-F3E3-4AA0-97AE-5E0506FD6B29}"/>
+              </a:ext>
+            </a:extLst>
+          </p:cNvPr>
+          <p:cNvCxnSpPr>
+            <a:cxnSpLocks/>
+            <a:stCxn id="11" idx="2"/>
+            <a:endCxn id="12" idx="0"/>
+          </p:cNvCxnSpPr>
+          <p:nvPr/>
+        </p:nvCxnSpPr>
+        <p:spPr>
+          <a:xfrm>
+            <a:off x="6072325" y="4266327"/>
+            <a:ext cx="3772" cy="202763"/>
+          </a:xfrm>
+          <a:prstGeom prst="straightConnector1">
+            <a:avLst/>
+          </a:prstGeom>
+          <a:ln>
+            <a:tailEnd type="triangle"/>
+          </a:ln>
+        </p:spPr>
+        <p:style>
+          <a:lnRef idx="1">
+            <a:schemeClr val="accent1"/>
+          </a:lnRef>
+          <a:fillRef idx="0">
+            <a:schemeClr val="accent1"/>
+          </a:fillRef>
+          <a:effectRef idx="0">
+            <a:schemeClr val="accent1"/>
+          </a:effectRef>
+          <a:fontRef idx="minor">
+            <a:schemeClr val="tx1"/>
+          </a:fontRef>
+        </p:style>
+      </p:cxnSp>
+      <p:cxnSp>
+        <p:nvCxnSpPr>
+          <p:cNvPr id="48" name="Straight Arrow Connector 47">
+            <a:extLst>
+              <a:ext uri="{FF2B5EF4-FFF2-40B4-BE49-F238E27FC236}">
+                <a16:creationId xmlns:a16="http://schemas.microsoft.com/office/drawing/2014/main" id="{5E7BDED3-C411-46D9-833E-BBA5EA7231DA}"/>
+              </a:ext>
+            </a:extLst>
+          </p:cNvPr>
+          <p:cNvCxnSpPr>
+            <a:stCxn id="12" idx="2"/>
+            <a:endCxn id="7" idx="2"/>
+          </p:cNvCxnSpPr>
+          <p:nvPr/>
+        </p:nvCxnSpPr>
+        <p:spPr>
+          <a:xfrm flipH="1">
+            <a:off x="6072326" y="4937289"/>
+            <a:ext cx="3771" cy="415946"/>
+          </a:xfrm>
+          <a:prstGeom prst="straightConnector1">
+            <a:avLst/>
+          </a:prstGeom>
+          <a:ln>
+            <a:tailEnd type="triangle"/>
+          </a:ln>
+        </p:spPr>
+        <p:style>
+          <a:lnRef idx="1">
+            <a:schemeClr val="accent1"/>
+          </a:lnRef>
+          <a:fillRef idx="0">
+            <a:schemeClr val="accent1"/>
+          </a:fillRef>
+          <a:effectRef idx="0">
+            <a:schemeClr val="accent1"/>
+          </a:effectRef>
+          <a:fontRef idx="minor">
+            <a:schemeClr val="tx1"/>
+          </a:fontRef>
+        </p:style>
+      </p:cxnSp>
+      <p:sp>
+        <p:nvSpPr>
+          <p:cNvPr id="50" name="Flowchart: Terminator 49">
+            <a:extLst>
+              <a:ext uri="{FF2B5EF4-FFF2-40B4-BE49-F238E27FC236}">
+                <a16:creationId xmlns:a16="http://schemas.microsoft.com/office/drawing/2014/main" id="{8C22774F-656B-4FD4-9055-A2F73E9913AB}"/>
+              </a:ext>
+            </a:extLst>
+          </p:cNvPr>
+          <p:cNvSpPr/>
+          <p:nvPr/>
+        </p:nvSpPr>
+        <p:spPr>
+          <a:xfrm>
+            <a:off x="8728730" y="5875783"/>
+            <a:ext cx="1065446" cy="383046"/>
+          </a:xfrm>
+          <a:prstGeom prst="flowChartTerminator">
+            <a:avLst/>
+          </a:prstGeom>
+        </p:spPr>
+        <p:style>
+          <a:lnRef idx="2">
+            <a:schemeClr val="accent1">
+              <a:shade val="50000"/>
+            </a:schemeClr>
+          </a:lnRef>
+          <a:fillRef idx="1">
+            <a:schemeClr val="accent1"/>
+          </a:fillRef>
+          <a:effectRef idx="0">
+            <a:schemeClr val="accent1"/>
+          </a:effectRef>
+          <a:fontRef idx="minor">
+            <a:schemeClr val="lt1"/>
+          </a:fontRef>
+        </p:style>
+        <p:txBody>
+          <a:bodyPr rtlCol="0" anchor="ctr"/>
+          <a:lstStyle/>
+          <a:p>
+            <a:pPr algn="ctr"/>
+            <a:r>
+              <a:rPr lang="en-US" dirty="0"/>
+              <a:t>End</a:t>
+            </a:r>
+          </a:p>
+        </p:txBody>
+      </p:sp>
+      <p:sp>
+        <p:nvSpPr>
+          <p:cNvPr id="70" name="Flowchart: Process 69">
+            <a:extLst>
+              <a:ext uri="{FF2B5EF4-FFF2-40B4-BE49-F238E27FC236}">
+                <a16:creationId xmlns:a16="http://schemas.microsoft.com/office/drawing/2014/main" id="{636AA807-AD49-495A-BFF0-59E9693E3C44}"/>
+              </a:ext>
+            </a:extLst>
+          </p:cNvPr>
+          <p:cNvSpPr/>
+          <p:nvPr/>
+        </p:nvSpPr>
+        <p:spPr>
+          <a:xfrm>
+            <a:off x="5511550" y="3278126"/>
+            <a:ext cx="1121550" cy="372153"/>
+          </a:xfrm>
+          <a:prstGeom prst="flowChartProcess">
+            <a:avLst/>
+          </a:prstGeom>
+        </p:spPr>
+        <p:style>
+          <a:lnRef idx="2">
+            <a:schemeClr val="accent1">
+              <a:shade val="50000"/>
+            </a:schemeClr>
+          </a:lnRef>
+          <a:fillRef idx="1">
+            <a:schemeClr val="accent1"/>
+          </a:fillRef>
+          <a:effectRef idx="0">
+            <a:schemeClr val="accent1"/>
+          </a:effectRef>
+          <a:fontRef idx="minor">
+            <a:schemeClr val="lt1"/>
+          </a:fontRef>
+        </p:style>
+        <p:txBody>
+          <a:bodyPr rtlCol="0" anchor="ctr"/>
+          <a:lstStyle/>
+          <a:p>
+            <a:pPr algn="ctr"/>
+            <a:r>
+              <a:rPr lang="en-US" sz="1000" dirty="0"/>
+              <a:t>Aerodynamic Model</a:t>
+            </a:r>
+          </a:p>
+        </p:txBody>
+      </p:sp>
+      <p:cxnSp>
+        <p:nvCxnSpPr>
+          <p:cNvPr id="75" name="Straight Arrow Connector 74">
+            <a:extLst>
+              <a:ext uri="{FF2B5EF4-FFF2-40B4-BE49-F238E27FC236}">
+                <a16:creationId xmlns:a16="http://schemas.microsoft.com/office/drawing/2014/main" id="{42B051B9-0491-4624-939B-2AEF3E9B65CA}"/>
+              </a:ext>
+            </a:extLst>
+          </p:cNvPr>
+          <p:cNvCxnSpPr>
+            <a:cxnSpLocks/>
+            <a:stCxn id="9" idx="2"/>
+            <a:endCxn id="70" idx="0"/>
+          </p:cNvCxnSpPr>
+          <p:nvPr/>
+        </p:nvCxnSpPr>
+        <p:spPr>
+          <a:xfrm>
+            <a:off x="6072325" y="3061297"/>
+            <a:ext cx="0" cy="216829"/>
+          </a:xfrm>
+          <a:prstGeom prst="straightConnector1">
+            <a:avLst/>
+          </a:prstGeom>
+          <a:ln>
+            <a:tailEnd type="triangle"/>
+          </a:ln>
+        </p:spPr>
+        <p:style>
+          <a:lnRef idx="1">
+            <a:schemeClr val="accent1"/>
+          </a:lnRef>
+          <a:fillRef idx="0">
+            <a:schemeClr val="accent1"/>
+          </a:fillRef>
+          <a:effectRef idx="0">
+            <a:schemeClr val="accent1"/>
+          </a:effectRef>
+          <a:fontRef idx="minor">
+            <a:schemeClr val="tx1"/>
+          </a:fontRef>
+        </p:style>
+      </p:cxnSp>
+      <p:cxnSp>
+        <p:nvCxnSpPr>
+          <p:cNvPr id="76" name="Straight Arrow Connector 75">
+            <a:extLst>
+              <a:ext uri="{FF2B5EF4-FFF2-40B4-BE49-F238E27FC236}">
+                <a16:creationId xmlns:a16="http://schemas.microsoft.com/office/drawing/2014/main" id="{15254DA0-92F4-4DDF-BAC0-3AE21D9AECC9}"/>
+              </a:ext>
+            </a:extLst>
+          </p:cNvPr>
+          <p:cNvCxnSpPr>
+            <a:cxnSpLocks/>
+            <a:stCxn id="70" idx="2"/>
+            <a:endCxn id="11" idx="0"/>
+          </p:cNvCxnSpPr>
+          <p:nvPr/>
+        </p:nvCxnSpPr>
+        <p:spPr>
+          <a:xfrm>
+            <a:off x="6072325" y="3650279"/>
+            <a:ext cx="0" cy="243895"/>
+          </a:xfrm>
+          <a:prstGeom prst="straightConnector1">
+            <a:avLst/>
+          </a:prstGeom>
+          <a:ln>
+            <a:tailEnd type="triangle"/>
+          </a:ln>
+        </p:spPr>
+        <p:style>
+          <a:lnRef idx="1">
+            <a:schemeClr val="accent1"/>
+          </a:lnRef>
+          <a:fillRef idx="0">
+            <a:schemeClr val="accent1"/>
+          </a:fillRef>
+          <a:effectRef idx="0">
+            <a:schemeClr val="accent1"/>
+          </a:effectRef>
+          <a:fontRef idx="minor">
+            <a:schemeClr val="tx1"/>
+          </a:fontRef>
+        </p:style>
+      </p:cxnSp>
+      <p:cxnSp>
+        <p:nvCxnSpPr>
+          <p:cNvPr id="82" name="Straight Connector 81">
+            <a:extLst>
+              <a:ext uri="{FF2B5EF4-FFF2-40B4-BE49-F238E27FC236}">
+                <a16:creationId xmlns:a16="http://schemas.microsoft.com/office/drawing/2014/main" id="{A322FF2D-CCAA-4583-95E4-B4EC55A4BA3E}"/>
+              </a:ext>
+            </a:extLst>
+          </p:cNvPr>
+          <p:cNvCxnSpPr>
+            <a:stCxn id="12" idx="1"/>
+          </p:cNvCxnSpPr>
+          <p:nvPr/>
+        </p:nvCxnSpPr>
+        <p:spPr>
+          <a:xfrm flipH="1" flipV="1">
+            <a:off x="4856085" y="4703189"/>
+            <a:ext cx="462817" cy="1"/>
+          </a:xfrm>
+          <a:prstGeom prst="line">
+            <a:avLst/>
+          </a:prstGeom>
+        </p:spPr>
+        <p:style>
+          <a:lnRef idx="1">
+            <a:schemeClr val="accent1"/>
+          </a:lnRef>
+          <a:fillRef idx="0">
+            <a:schemeClr val="accent1"/>
+          </a:fillRef>
+          <a:effectRef idx="0">
+            <a:schemeClr val="accent1"/>
+          </a:effectRef>
+          <a:fontRef idx="minor">
+            <a:schemeClr val="tx1"/>
+          </a:fontRef>
+        </p:style>
+      </p:cxnSp>
+      <p:cxnSp>
+        <p:nvCxnSpPr>
+          <p:cNvPr id="84" name="Straight Connector 83">
+            <a:extLst>
+              <a:ext uri="{FF2B5EF4-FFF2-40B4-BE49-F238E27FC236}">
+                <a16:creationId xmlns:a16="http://schemas.microsoft.com/office/drawing/2014/main" id="{ABA84BD7-8A05-4E0D-9C93-082D520B5285}"/>
+              </a:ext>
+            </a:extLst>
+          </p:cNvPr>
+          <p:cNvCxnSpPr/>
+          <p:nvPr/>
+        </p:nvCxnSpPr>
+        <p:spPr>
+          <a:xfrm flipV="1">
+            <a:off x="4873841" y="1893451"/>
+            <a:ext cx="0" cy="2809738"/>
+          </a:xfrm>
+          <a:prstGeom prst="line">
+            <a:avLst/>
+          </a:prstGeom>
+        </p:spPr>
+        <p:style>
+          <a:lnRef idx="1">
+            <a:schemeClr val="accent1"/>
+          </a:lnRef>
+          <a:fillRef idx="0">
+            <a:schemeClr val="accent1"/>
+          </a:fillRef>
+          <a:effectRef idx="0">
+            <a:schemeClr val="accent1"/>
+          </a:effectRef>
+          <a:fontRef idx="minor">
+            <a:schemeClr val="tx1"/>
+          </a:fontRef>
+        </p:style>
+      </p:cxnSp>
+      <p:cxnSp>
+        <p:nvCxnSpPr>
+          <p:cNvPr id="86" name="Straight Connector 85">
+            <a:extLst>
+              <a:ext uri="{FF2B5EF4-FFF2-40B4-BE49-F238E27FC236}">
+                <a16:creationId xmlns:a16="http://schemas.microsoft.com/office/drawing/2014/main" id="{DF0BB50F-04BE-4635-A7F9-D90D0D9F27E5}"/>
+              </a:ext>
+            </a:extLst>
+          </p:cNvPr>
+          <p:cNvCxnSpPr/>
+          <p:nvPr/>
+        </p:nvCxnSpPr>
+        <p:spPr>
+          <a:xfrm>
+            <a:off x="4856085" y="1882066"/>
+            <a:ext cx="1216239" cy="0"/>
+          </a:xfrm>
+          <a:prstGeom prst="line">
+            <a:avLst/>
+          </a:prstGeom>
+        </p:spPr>
+        <p:style>
+          <a:lnRef idx="1">
+            <a:schemeClr val="accent1"/>
+          </a:lnRef>
+          <a:fillRef idx="0">
+            <a:schemeClr val="accent1"/>
+          </a:fillRef>
+          <a:effectRef idx="0">
+            <a:schemeClr val="accent1"/>
+          </a:effectRef>
+          <a:fontRef idx="minor">
+            <a:schemeClr val="tx1"/>
+          </a:fontRef>
+        </p:style>
+      </p:cxnSp>
+      <p:cxnSp>
+        <p:nvCxnSpPr>
+          <p:cNvPr id="88" name="Straight Connector 87">
+            <a:extLst>
+              <a:ext uri="{FF2B5EF4-FFF2-40B4-BE49-F238E27FC236}">
+                <a16:creationId xmlns:a16="http://schemas.microsoft.com/office/drawing/2014/main" id="{23356B00-83E5-4AA1-A621-095D28D1408D}"/>
+              </a:ext>
+            </a:extLst>
+          </p:cNvPr>
+          <p:cNvCxnSpPr>
+            <a:endCxn id="10" idx="0"/>
+          </p:cNvCxnSpPr>
+          <p:nvPr/>
+        </p:nvCxnSpPr>
+        <p:spPr>
+          <a:xfrm>
+            <a:off x="6072324" y="1893451"/>
+            <a:ext cx="1" cy="193711"/>
+          </a:xfrm>
+          <a:prstGeom prst="line">
+            <a:avLst/>
+          </a:prstGeom>
+        </p:spPr>
+        <p:style>
+          <a:lnRef idx="1">
+            <a:schemeClr val="accent1"/>
+          </a:lnRef>
+          <a:fillRef idx="0">
+            <a:schemeClr val="accent1"/>
+          </a:fillRef>
+          <a:effectRef idx="0">
+            <a:schemeClr val="accent1"/>
+          </a:effectRef>
+          <a:fontRef idx="minor">
+            <a:schemeClr val="tx1"/>
+          </a:fontRef>
+        </p:style>
+      </p:cxnSp>
+      <p:sp>
+        <p:nvSpPr>
+          <p:cNvPr id="89" name="TextBox 88">
+            <a:extLst>
+              <a:ext uri="{FF2B5EF4-FFF2-40B4-BE49-F238E27FC236}">
+                <a16:creationId xmlns:a16="http://schemas.microsoft.com/office/drawing/2014/main" id="{1E33251F-8F5C-400F-8BC0-9E1D352C081C}"/>
+              </a:ext>
+            </a:extLst>
+          </p:cNvPr>
+          <p:cNvSpPr txBox="1"/>
+          <p:nvPr/>
+        </p:nvSpPr>
+        <p:spPr>
+          <a:xfrm>
+            <a:off x="5563247" y="5001552"/>
+            <a:ext cx="386837" cy="276999"/>
+          </a:xfrm>
+          <a:prstGeom prst="rect">
+            <a:avLst/>
+          </a:prstGeom>
+          <a:noFill/>
+        </p:spPr>
+        <p:txBody>
+          <a:bodyPr wrap="none" rtlCol="0">
+            <a:spAutoFit/>
+          </a:bodyPr>
+          <a:lstStyle/>
+          <a:p>
+            <a:r>
+              <a:rPr lang="en-US" sz="1200" dirty="0"/>
+              <a:t>Yes</a:t>
+            </a:r>
+          </a:p>
+        </p:txBody>
+      </p:sp>
+      <p:sp>
+        <p:nvSpPr>
+          <p:cNvPr id="90" name="TextBox 89">
+            <a:extLst>
+              <a:ext uri="{FF2B5EF4-FFF2-40B4-BE49-F238E27FC236}">
+                <a16:creationId xmlns:a16="http://schemas.microsoft.com/office/drawing/2014/main" id="{ED7C7091-0616-4C28-AA44-1C73F87996BB}"/>
+              </a:ext>
+            </a:extLst>
+          </p:cNvPr>
+          <p:cNvSpPr txBox="1"/>
+          <p:nvPr/>
+        </p:nvSpPr>
+        <p:spPr>
+          <a:xfrm>
+            <a:off x="4860791" y="4389644"/>
+            <a:ext cx="365806" cy="276999"/>
+          </a:xfrm>
+          <a:prstGeom prst="rect">
+            <a:avLst/>
+          </a:prstGeom>
+          <a:noFill/>
+        </p:spPr>
+        <p:txBody>
+          <a:bodyPr wrap="none" rtlCol="0">
+            <a:spAutoFit/>
+          </a:bodyPr>
+          <a:lstStyle/>
+          <a:p>
+            <a:r>
+              <a:rPr lang="en-US" sz="1200" dirty="0"/>
+              <a:t>No</a:t>
+            </a:r>
+          </a:p>
+        </p:txBody>
+      </p:sp>
+      <p:sp>
+        <p:nvSpPr>
+          <p:cNvPr id="91" name="Flowchart: Decision 90">
+            <a:extLst>
+              <a:ext uri="{FF2B5EF4-FFF2-40B4-BE49-F238E27FC236}">
+                <a16:creationId xmlns:a16="http://schemas.microsoft.com/office/drawing/2014/main" id="{427AC1B4-C377-4825-91FE-E8E4DA6011F9}"/>
+              </a:ext>
+            </a:extLst>
+          </p:cNvPr>
+          <p:cNvSpPr/>
+          <p:nvPr/>
+        </p:nvSpPr>
+        <p:spPr>
+          <a:xfrm>
+            <a:off x="5274309" y="5786947"/>
+            <a:ext cx="1596030" cy="548548"/>
+          </a:xfrm>
+          <a:prstGeom prst="flowChartDecision">
+            <a:avLst/>
+          </a:prstGeom>
+        </p:spPr>
+        <p:style>
+          <a:lnRef idx="2">
+            <a:schemeClr val="accent1">
+              <a:shade val="50000"/>
+            </a:schemeClr>
+          </a:lnRef>
+          <a:fillRef idx="1">
+            <a:schemeClr val="accent1"/>
+          </a:fillRef>
+          <a:effectRef idx="0">
+            <a:schemeClr val="accent1"/>
+          </a:effectRef>
+          <a:fontRef idx="minor">
+            <a:schemeClr val="lt1"/>
+          </a:fontRef>
+        </p:style>
+        <p:txBody>
+          <a:bodyPr rtlCol="0" anchor="ctr"/>
+          <a:lstStyle/>
+          <a:p>
+            <a:pPr algn="ctr"/>
+            <a:r>
+              <a:rPr lang="en-US" sz="1000" dirty="0"/>
+              <a:t>Runs completed?</a:t>
+            </a:r>
+          </a:p>
+        </p:txBody>
+      </p:sp>
+      <p:sp>
+        <p:nvSpPr>
+          <p:cNvPr id="92" name="TextBox 91">
+            <a:extLst>
+              <a:ext uri="{FF2B5EF4-FFF2-40B4-BE49-F238E27FC236}">
+                <a16:creationId xmlns:a16="http://schemas.microsoft.com/office/drawing/2014/main" id="{C65366B9-E5AF-4814-AE18-AF9B7BB938FE}"/>
+              </a:ext>
+            </a:extLst>
+          </p:cNvPr>
+          <p:cNvSpPr txBox="1"/>
+          <p:nvPr/>
+        </p:nvSpPr>
+        <p:spPr>
+          <a:xfrm>
+            <a:off x="6866454" y="5695465"/>
+            <a:ext cx="386837" cy="276999"/>
+          </a:xfrm>
+          <a:prstGeom prst="rect">
+            <a:avLst/>
+          </a:prstGeom>
+          <a:noFill/>
+        </p:spPr>
+        <p:txBody>
+          <a:bodyPr wrap="none" rtlCol="0">
+            <a:spAutoFit/>
+          </a:bodyPr>
+          <a:lstStyle/>
+          <a:p>
+            <a:r>
+              <a:rPr lang="en-US" sz="1200" dirty="0"/>
+              <a:t>Yes</a:t>
+            </a:r>
+          </a:p>
+        </p:txBody>
+      </p:sp>
+      <p:sp>
+        <p:nvSpPr>
+          <p:cNvPr id="93" name="TextBox 92">
+            <a:extLst>
+              <a:ext uri="{FF2B5EF4-FFF2-40B4-BE49-F238E27FC236}">
+                <a16:creationId xmlns:a16="http://schemas.microsoft.com/office/drawing/2014/main" id="{88CBC8E4-FCD5-41B9-A215-E030F1FCD519}"/>
+              </a:ext>
+            </a:extLst>
+          </p:cNvPr>
+          <p:cNvSpPr txBox="1"/>
+          <p:nvPr/>
+        </p:nvSpPr>
+        <p:spPr>
+          <a:xfrm>
+            <a:off x="4622829" y="5705678"/>
+            <a:ext cx="386837" cy="276999"/>
+          </a:xfrm>
+          <a:prstGeom prst="rect">
+            <a:avLst/>
+          </a:prstGeom>
+          <a:noFill/>
+        </p:spPr>
+        <p:txBody>
+          <a:bodyPr wrap="none" rtlCol="0">
+            <a:spAutoFit/>
+          </a:bodyPr>
+          <a:lstStyle/>
+          <a:p>
+            <a:r>
+              <a:rPr lang="en-US" sz="1200" dirty="0"/>
+              <a:t>Yes</a:t>
+            </a:r>
+          </a:p>
+        </p:txBody>
+      </p:sp>
+      <p:cxnSp>
+        <p:nvCxnSpPr>
+          <p:cNvPr id="95" name="Straight Arrow Connector 94">
+            <a:extLst>
+              <a:ext uri="{FF2B5EF4-FFF2-40B4-BE49-F238E27FC236}">
+                <a16:creationId xmlns:a16="http://schemas.microsoft.com/office/drawing/2014/main" id="{8504DFDF-86B0-4940-8C32-1D5FD0411903}"/>
+              </a:ext>
+            </a:extLst>
+          </p:cNvPr>
+          <p:cNvCxnSpPr>
+            <a:stCxn id="91" idx="3"/>
+            <a:endCxn id="6" idx="2"/>
+          </p:cNvCxnSpPr>
+          <p:nvPr/>
+        </p:nvCxnSpPr>
+        <p:spPr>
+          <a:xfrm>
+            <a:off x="6870339" y="6061221"/>
+            <a:ext cx="489497" cy="6085"/>
+          </a:xfrm>
+          <a:prstGeom prst="straightConnector1">
+            <a:avLst/>
+          </a:prstGeom>
+          <a:ln>
+            <a:tailEnd type="triangle"/>
+          </a:ln>
+        </p:spPr>
+        <p:style>
+          <a:lnRef idx="1">
+            <a:schemeClr val="accent1"/>
+          </a:lnRef>
+          <a:fillRef idx="0">
+            <a:schemeClr val="accent1"/>
+          </a:fillRef>
+          <a:effectRef idx="0">
+            <a:schemeClr val="accent1"/>
+          </a:effectRef>
+          <a:fontRef idx="minor">
+            <a:schemeClr val="tx1"/>
+          </a:fontRef>
+        </p:style>
+      </p:cxnSp>
+      <p:cxnSp>
+        <p:nvCxnSpPr>
+          <p:cNvPr id="97" name="Straight Arrow Connector 96">
+            <a:extLst>
+              <a:ext uri="{FF2B5EF4-FFF2-40B4-BE49-F238E27FC236}">
+                <a16:creationId xmlns:a16="http://schemas.microsoft.com/office/drawing/2014/main" id="{016834EC-CBE7-4A0A-ABC7-CDBC936972A2}"/>
+              </a:ext>
+            </a:extLst>
+          </p:cNvPr>
+          <p:cNvCxnSpPr>
+            <a:stCxn id="6" idx="5"/>
+            <a:endCxn id="50" idx="1"/>
+          </p:cNvCxnSpPr>
+          <p:nvPr/>
+        </p:nvCxnSpPr>
+        <p:spPr>
+          <a:xfrm>
+            <a:off x="8212192" y="6067306"/>
+            <a:ext cx="516538" cy="0"/>
+          </a:xfrm>
+          <a:prstGeom prst="straightConnector1">
+            <a:avLst/>
+          </a:prstGeom>
+          <a:ln>
+            <a:tailEnd type="triangle"/>
+          </a:ln>
+        </p:spPr>
+        <p:style>
+          <a:lnRef idx="1">
+            <a:schemeClr val="accent1"/>
+          </a:lnRef>
+          <a:fillRef idx="0">
+            <a:schemeClr val="accent1"/>
+          </a:fillRef>
+          <a:effectRef idx="0">
+            <a:schemeClr val="accent1"/>
+          </a:effectRef>
+          <a:fontRef idx="minor">
+            <a:schemeClr val="tx1"/>
+          </a:fontRef>
+        </p:style>
+      </p:cxnSp>
+      <p:cxnSp>
+        <p:nvCxnSpPr>
+          <p:cNvPr id="99" name="Straight Connector 98">
+            <a:extLst>
+              <a:ext uri="{FF2B5EF4-FFF2-40B4-BE49-F238E27FC236}">
+                <a16:creationId xmlns:a16="http://schemas.microsoft.com/office/drawing/2014/main" id="{84ED786F-F7D9-4C1D-9C6C-B5B90EE9512C}"/>
+              </a:ext>
+            </a:extLst>
+          </p:cNvPr>
+          <p:cNvCxnSpPr>
+            <a:stCxn id="91" idx="1"/>
+          </p:cNvCxnSpPr>
+          <p:nvPr/>
+        </p:nvCxnSpPr>
+        <p:spPr>
+          <a:xfrm flipH="1">
+            <a:off x="2725445" y="6061221"/>
+            <a:ext cx="2548864" cy="0"/>
+          </a:xfrm>
+          <a:prstGeom prst="line">
+            <a:avLst/>
+          </a:prstGeom>
+        </p:spPr>
+        <p:style>
+          <a:lnRef idx="1">
+            <a:schemeClr val="accent1"/>
+          </a:lnRef>
+          <a:fillRef idx="0">
+            <a:schemeClr val="accent1"/>
+          </a:fillRef>
+          <a:effectRef idx="0">
+            <a:schemeClr val="accent1"/>
+          </a:effectRef>
+          <a:fontRef idx="minor">
+            <a:schemeClr val="tx1"/>
+          </a:fontRef>
+        </p:style>
+      </p:cxnSp>
+      <p:cxnSp>
+        <p:nvCxnSpPr>
+          <p:cNvPr id="103" name="Straight Connector 102">
+            <a:extLst>
+              <a:ext uri="{FF2B5EF4-FFF2-40B4-BE49-F238E27FC236}">
+                <a16:creationId xmlns:a16="http://schemas.microsoft.com/office/drawing/2014/main" id="{00B40405-A624-4B9C-B2B0-9686F6F5A0E6}"/>
+              </a:ext>
+            </a:extLst>
+          </p:cNvPr>
+          <p:cNvCxnSpPr>
+            <a:cxnSpLocks/>
+          </p:cNvCxnSpPr>
+          <p:nvPr/>
+        </p:nvCxnSpPr>
+        <p:spPr>
+          <a:xfrm>
+            <a:off x="2725445" y="1323632"/>
+            <a:ext cx="1615736" cy="0"/>
+          </a:xfrm>
+          <a:prstGeom prst="line">
+            <a:avLst/>
+          </a:prstGeom>
+        </p:spPr>
+        <p:style>
+          <a:lnRef idx="1">
+            <a:schemeClr val="accent1"/>
+          </a:lnRef>
+          <a:fillRef idx="0">
+            <a:schemeClr val="accent1"/>
+          </a:fillRef>
+          <a:effectRef idx="0">
+            <a:schemeClr val="accent1"/>
+          </a:effectRef>
+          <a:fontRef idx="minor">
+            <a:schemeClr val="tx1"/>
+          </a:fontRef>
+        </p:style>
+      </p:cxnSp>
+      <p:cxnSp>
+        <p:nvCxnSpPr>
+          <p:cNvPr id="113" name="Straight Connector 112">
+            <a:extLst>
+              <a:ext uri="{FF2B5EF4-FFF2-40B4-BE49-F238E27FC236}">
+                <a16:creationId xmlns:a16="http://schemas.microsoft.com/office/drawing/2014/main" id="{DE51E399-1295-40AA-B79F-445C27C65DE4}"/>
+              </a:ext>
+            </a:extLst>
+          </p:cNvPr>
+          <p:cNvCxnSpPr/>
+          <p:nvPr/>
+        </p:nvCxnSpPr>
+        <p:spPr>
+          <a:xfrm flipV="1">
+            <a:off x="2725445" y="1323632"/>
+            <a:ext cx="0" cy="4737589"/>
+          </a:xfrm>
+          <a:prstGeom prst="line">
+            <a:avLst/>
+          </a:prstGeom>
+        </p:spPr>
+        <p:style>
+          <a:lnRef idx="1">
+            <a:schemeClr val="accent1"/>
+          </a:lnRef>
+          <a:fillRef idx="0">
+            <a:schemeClr val="accent1"/>
+          </a:fillRef>
+          <a:effectRef idx="0">
+            <a:schemeClr val="accent1"/>
+          </a:effectRef>
+          <a:fontRef idx="minor">
+            <a:schemeClr val="tx1"/>
+          </a:fontRef>
+        </p:style>
+      </p:cxnSp>
+      <p:cxnSp>
+        <p:nvCxnSpPr>
+          <p:cNvPr id="117" name="Straight Arrow Connector 116">
+            <a:extLst>
+              <a:ext uri="{FF2B5EF4-FFF2-40B4-BE49-F238E27FC236}">
+                <a16:creationId xmlns:a16="http://schemas.microsoft.com/office/drawing/2014/main" id="{673A59B5-4279-421B-8BEB-D9D2044D82ED}"/>
+              </a:ext>
+            </a:extLst>
+          </p:cNvPr>
+          <p:cNvCxnSpPr>
+            <a:endCxn id="5" idx="1"/>
+          </p:cNvCxnSpPr>
+          <p:nvPr/>
+        </p:nvCxnSpPr>
+        <p:spPr>
+          <a:xfrm flipV="1">
+            <a:off x="4341181" y="1017308"/>
+            <a:ext cx="668485" cy="306324"/>
+          </a:xfrm>
+          <a:prstGeom prst="straightConnector1">
+            <a:avLst/>
+          </a:prstGeom>
+          <a:ln>
+            <a:tailEnd type="triangle"/>
+          </a:ln>
+        </p:spPr>
+        <p:style>
+          <a:lnRef idx="1">
+            <a:schemeClr val="accent1"/>
+          </a:lnRef>
+          <a:fillRef idx="0">
+            <a:schemeClr val="accent1"/>
+          </a:fillRef>
+          <a:effectRef idx="0">
+            <a:schemeClr val="accent1"/>
+          </a:effectRef>
+          <a:fontRef idx="minor">
+            <a:schemeClr val="tx1"/>
+          </a:fontRef>
+        </p:style>
+      </p:cxnSp>
+      <p:cxnSp>
+        <p:nvCxnSpPr>
+          <p:cNvPr id="119" name="Straight Arrow Connector 118">
+            <a:extLst>
+              <a:ext uri="{FF2B5EF4-FFF2-40B4-BE49-F238E27FC236}">
+                <a16:creationId xmlns:a16="http://schemas.microsoft.com/office/drawing/2014/main" id="{D3B2953A-F491-4ADF-B894-DBA46F41C520}"/>
+              </a:ext>
+            </a:extLst>
+          </p:cNvPr>
+          <p:cNvCxnSpPr>
+            <a:stCxn id="7" idx="2"/>
+            <a:endCxn id="91" idx="0"/>
+          </p:cNvCxnSpPr>
+          <p:nvPr/>
+        </p:nvCxnSpPr>
+        <p:spPr>
+          <a:xfrm flipH="1">
+            <a:off x="6072324" y="5353235"/>
+            <a:ext cx="2" cy="433712"/>
+          </a:xfrm>
+          <a:prstGeom prst="straightConnector1">
+            <a:avLst/>
+          </a:prstGeom>
+          <a:ln>
+            <a:tailEnd type="triangle"/>
+          </a:ln>
+        </p:spPr>
+        <p:style>
+          <a:lnRef idx="1">
+            <a:schemeClr val="accent1"/>
+          </a:lnRef>
+          <a:fillRef idx="0">
+            <a:schemeClr val="accent1"/>
+          </a:fillRef>
+          <a:effectRef idx="0">
+            <a:schemeClr val="accent1"/>
+          </a:effectRef>
+          <a:fontRef idx="minor">
+            <a:schemeClr val="tx1"/>
+          </a:fontRef>
+        </p:style>
+      </p:cxnSp>
+    </p:spTree>
+    <p:extLst>
+      <p:ext uri="{BB962C8B-B14F-4D97-AF65-F5344CB8AC3E}">
+        <p14:creationId xmlns:p14="http://schemas.microsoft.com/office/powerpoint/2010/main" val="2517911635"/>
+      </p:ext>
+    </p:extLst>
+  </p:cSld>
+  <p:clrMapOvr>
+    <a:masterClrMapping/>
+  </p:clrMapOvr>
+</p:sld>
+</file>
+
+<file path=ppt/slides/slide17.xml><?xml version="1.0" encoding="utf-8"?>
+<p:sld xmlns:a="http://schemas.openxmlformats.org/drawingml/2006/main" xmlns:r="http://schemas.openxmlformats.org/officeDocument/2006/relationships" xmlns:p="http://schemas.openxmlformats.org/presentationml/2006/main">
+  <p:cSld>
+    <p:spTree>
+      <p:nvGrpSpPr>
+        <p:cNvPr id="1" name=""/>
+        <p:cNvGrpSpPr/>
+        <p:nvPr/>
+      </p:nvGrpSpPr>
+      <p:grpSpPr>
+        <a:xfrm>
+          <a:off x="0" y="0"/>
+          <a:ext cx="0" cy="0"/>
+          <a:chOff x="0" y="0"/>
+          <a:chExt cx="0" cy="0"/>
+        </a:xfrm>
+      </p:grpSpPr>
+      <p:sp>
+        <p:nvSpPr>
+          <p:cNvPr id="2" name="Title 1">
+            <a:extLst>
+              <a:ext uri="{FF2B5EF4-FFF2-40B4-BE49-F238E27FC236}">
+                <a16:creationId xmlns:a16="http://schemas.microsoft.com/office/drawing/2014/main" id="{863D8525-B8F2-462E-B323-D094C2F3DBFF}"/>
+              </a:ext>
+            </a:extLst>
+          </p:cNvPr>
+          <p:cNvSpPr>
+            <a:spLocks noGrp="1"/>
+          </p:cNvSpPr>
+          <p:nvPr>
+            <p:ph type="title"/>
+          </p:nvPr>
+        </p:nvSpPr>
+        <p:spPr/>
+        <p:txBody>
+          <a:bodyPr/>
+          <a:lstStyle/>
+          <a:p>
+            <a:r>
+              <a:rPr lang="en-US" dirty="0"/>
+              <a:t>Results and Discussion</a:t>
+            </a:r>
+          </a:p>
+        </p:txBody>
+      </p:sp>
+      <p:sp>
+        <p:nvSpPr>
+          <p:cNvPr id="3" name="Text Placeholder 2">
+            <a:extLst>
+              <a:ext uri="{FF2B5EF4-FFF2-40B4-BE49-F238E27FC236}">
+                <a16:creationId xmlns:a16="http://schemas.microsoft.com/office/drawing/2014/main" id="{74790C9B-17F4-4B25-955E-F948E1AA44B8}"/>
+              </a:ext>
+            </a:extLst>
+          </p:cNvPr>
+          <p:cNvSpPr>
+            <a:spLocks noGrp="1"/>
+          </p:cNvSpPr>
+          <p:nvPr>
+            <p:ph type="body" idx="1"/>
+          </p:nvPr>
+        </p:nvSpPr>
+        <p:spPr/>
+        <p:txBody>
+          <a:bodyPr/>
+          <a:lstStyle/>
+          <a:p>
+            <a:endParaRPr lang="en-US"/>
+          </a:p>
+        </p:txBody>
+      </p:sp>
+      <p:sp>
+        <p:nvSpPr>
+          <p:cNvPr id="4" name="Slide Number Placeholder 3">
+            <a:extLst>
+              <a:ext uri="{FF2B5EF4-FFF2-40B4-BE49-F238E27FC236}">
+                <a16:creationId xmlns:a16="http://schemas.microsoft.com/office/drawing/2014/main" id="{22C9336B-DF26-49FD-8F2D-4E9398179DD1}"/>
+              </a:ext>
+            </a:extLst>
+          </p:cNvPr>
+          <p:cNvSpPr>
+            <a:spLocks noGrp="1"/>
+          </p:cNvSpPr>
+          <p:nvPr>
+            <p:ph type="sldNum" sz="quarter" idx="12"/>
+          </p:nvPr>
+        </p:nvSpPr>
+        <p:spPr/>
+        <p:txBody>
+          <a:bodyPr/>
+          <a:lstStyle/>
+          <a:p>
+            <a:fld id="{883A1948-8D50-4BC1-A052-3D414D62852E}" type="slidenum">
+              <a:rPr lang="en-US" smtClean="0"/>
+              <a:t>17</a:t>
+            </a:fld>
+            <a:endParaRPr lang="en-US"/>
+          </a:p>
+        </p:txBody>
+      </p:sp>
+    </p:spTree>
+    <p:extLst>
+      <p:ext uri="{BB962C8B-B14F-4D97-AF65-F5344CB8AC3E}">
+        <p14:creationId xmlns:p14="http://schemas.microsoft.com/office/powerpoint/2010/main" val="1583861834"/>
+      </p:ext>
+    </p:extLst>
+  </p:cSld>
+  <p:clrMapOvr>
+    <a:masterClrMapping/>
+  </p:clrMapOvr>
+</p:sld>
+</file>
+
+<file path=ppt/slides/slide18.xml><?xml version="1.0" encoding="utf-8"?>
+<p:sld xmlns:a="http://schemas.openxmlformats.org/drawingml/2006/main" xmlns:r="http://schemas.openxmlformats.org/officeDocument/2006/relationships" xmlns:p="http://schemas.openxmlformats.org/presentationml/2006/main">
+  <p:cSld>
+    <p:spTree>
+      <p:nvGrpSpPr>
+        <p:cNvPr id="1" name=""/>
+        <p:cNvGrpSpPr/>
+        <p:nvPr/>
+      </p:nvGrpSpPr>
+      <p:grpSpPr>
+        <a:xfrm>
+          <a:off x="0" y="0"/>
+          <a:ext cx="0" cy="0"/>
+          <a:chOff x="0" y="0"/>
+          <a:chExt cx="0" cy="0"/>
+        </a:xfrm>
+      </p:grpSpPr>
+      <p:sp>
+        <p:nvSpPr>
+          <p:cNvPr id="2" name="Title 1">
+            <a:extLst>
+              <a:ext uri="{FF2B5EF4-FFF2-40B4-BE49-F238E27FC236}">
+                <a16:creationId xmlns:a16="http://schemas.microsoft.com/office/drawing/2014/main" id="{DCB2E18E-2F7E-4062-B4E1-0B1A59E3EB8A}"/>
+              </a:ext>
+            </a:extLst>
+          </p:cNvPr>
+          <p:cNvSpPr>
+            <a:spLocks noGrp="1"/>
+          </p:cNvSpPr>
+          <p:nvPr>
+            <p:ph type="title"/>
+          </p:nvPr>
+        </p:nvSpPr>
+        <p:spPr/>
+        <p:txBody>
+          <a:bodyPr/>
+          <a:lstStyle/>
+          <a:p>
+            <a:r>
+              <a:rPr lang="en-US" dirty="0"/>
+              <a:t>Future Work</a:t>
+            </a:r>
+          </a:p>
+        </p:txBody>
+      </p:sp>
+      <p:sp>
+        <p:nvSpPr>
+          <p:cNvPr id="3" name="Text Placeholder 2">
+            <a:extLst>
+              <a:ext uri="{FF2B5EF4-FFF2-40B4-BE49-F238E27FC236}">
+                <a16:creationId xmlns:a16="http://schemas.microsoft.com/office/drawing/2014/main" id="{FD8599A4-623D-4C8F-80C3-4BDDA15FF090}"/>
+              </a:ext>
+            </a:extLst>
+          </p:cNvPr>
+          <p:cNvSpPr>
+            <a:spLocks noGrp="1"/>
+          </p:cNvSpPr>
+          <p:nvPr>
+            <p:ph type="body" idx="1"/>
+          </p:nvPr>
+        </p:nvSpPr>
+        <p:spPr/>
+        <p:txBody>
+          <a:bodyPr/>
+          <a:lstStyle/>
+          <a:p>
+            <a:endParaRPr lang="en-US"/>
+          </a:p>
+        </p:txBody>
+      </p:sp>
+      <p:sp>
+        <p:nvSpPr>
+          <p:cNvPr id="4" name="Slide Number Placeholder 3">
+            <a:extLst>
+              <a:ext uri="{FF2B5EF4-FFF2-40B4-BE49-F238E27FC236}">
+                <a16:creationId xmlns:a16="http://schemas.microsoft.com/office/drawing/2014/main" id="{35BC314C-9E9B-43BF-BB8B-81996365F20F}"/>
+              </a:ext>
+            </a:extLst>
+          </p:cNvPr>
+          <p:cNvSpPr>
+            <a:spLocks noGrp="1"/>
+          </p:cNvSpPr>
+          <p:nvPr>
+            <p:ph type="sldNum" sz="quarter" idx="12"/>
+          </p:nvPr>
+        </p:nvSpPr>
+        <p:spPr/>
+        <p:txBody>
+          <a:bodyPr/>
+          <a:lstStyle/>
+          <a:p>
+            <a:fld id="{883A1948-8D50-4BC1-A052-3D414D62852E}" type="slidenum">
+              <a:rPr lang="en-US" smtClean="0"/>
+              <a:t>18</a:t>
             </a:fld>
             <a:endParaRPr lang="en-US"/>
           </a:p>
@@ -6323,7 +9535,7 @@
         </p:spPr>
         <p:txBody>
           <a:bodyPr vert="horz" lIns="91440" tIns="45720" rIns="91440" bIns="45720" rtlCol="0" anchor="ctr">
-            <a:normAutofit lnSpcReduction="10000"/>
+            <a:normAutofit fontScale="92500"/>
           </a:bodyPr>
           <a:lstStyle/>
           <a:p>
@@ -6354,6 +9566,16 @@
             <a:r>
               <a:rPr lang="en-US" sz="1800" dirty="0"/>
               <a:t>Safety criticality for landing</a:t>
+            </a:r>
+          </a:p>
+          <a:p>
+            <a:pPr marL="285750" indent="-228600">
+              <a:buFont typeface="Arial" panose="020B0604020202020204" pitchFamily="34" charset="0"/>
+              <a:buChar char="•"/>
+            </a:pPr>
+            <a:r>
+              <a:rPr lang="en-US" sz="1800" dirty="0"/>
+              <a:t>Thin but significant atmosphere</a:t>
             </a:r>
           </a:p>
           <a:p>

</xml_diff>